<commit_message>
revised poster according to suggestion from Angela
</commit_message>
<xml_diff>
--- a/poster/fast18_poster.pptx
+++ b/poster/fast18_poster.pptx
@@ -136,10 +136,10 @@
           <c:layoutTarget val="inner"/>
           <c:xMode val="edge"/>
           <c:yMode val="edge"/>
-          <c:x val="0.61083692839279813"/>
-          <c:y val="5.1192544430694563E-2"/>
-          <c:w val="0.33184206060008237"/>
-          <c:h val="0.72176687201094358"/>
+          <c:x val="0.51739675109595362"/>
+          <c:y val="0"/>
+          <c:w val="0.2509263778501325"/>
+          <c:h val="0.60588701002538614"/>
         </c:manualLayout>
       </c:layout>
       <c:barChart>
@@ -178,26 +178,17 @@
             <c:noEndCap val="0"/>
             <c:plus>
               <c:numRef>
-                <c:f>Sheet1!$H$2:$H$8</c:f>
+                <c:f>Sheet1!$G$2:$G$4</c:f>
                 <c:numCache>
                   <c:formatCode>General</c:formatCode>
-                  <c:ptCount val="7"/>
+                  <c:ptCount val="3"/>
                   <c:pt idx="0">
-                    <c:v>86.899646070000003</c:v>
+                    <c:v>74.579070639999998</c:v>
                   </c:pt>
                   <c:pt idx="1">
-                    <c:v>47.026277149999999</c:v>
+                    <c:v>56.259226890000001</c:v>
                   </c:pt>
                   <c:pt idx="2">
-                    <c:v>98.939352290000002</c:v>
-                  </c:pt>
-                  <c:pt idx="4">
-                    <c:v>74.579070639999998</c:v>
-                  </c:pt>
-                  <c:pt idx="5">
-                    <c:v>56.259226890000001</c:v>
-                  </c:pt>
-                  <c:pt idx="6">
                     <c:v>108.2791673</c:v>
                   </c:pt>
                 </c:numCache>
@@ -205,26 +196,17 @@
             </c:plus>
             <c:minus>
               <c:numRef>
-                <c:f>Sheet1!$H$2:$H$8</c:f>
+                <c:f>Sheet1!$G$2:$G$4</c:f>
                 <c:numCache>
                   <c:formatCode>General</c:formatCode>
-                  <c:ptCount val="7"/>
+                  <c:ptCount val="3"/>
                   <c:pt idx="0">
-                    <c:v>86.899646070000003</c:v>
+                    <c:v>74.579070639999998</c:v>
                   </c:pt>
                   <c:pt idx="1">
-                    <c:v>47.026277149999999</c:v>
+                    <c:v>56.259226890000001</c:v>
                   </c:pt>
                   <c:pt idx="2">
-                    <c:v>98.939352290000002</c:v>
-                  </c:pt>
-                  <c:pt idx="4">
-                    <c:v>74.579070639999998</c:v>
-                  </c:pt>
-                  <c:pt idx="5">
-                    <c:v>56.259226890000001</c:v>
-                  </c:pt>
-                  <c:pt idx="6">
                     <c:v>108.2791673</c:v>
                   </c:pt>
                 </c:numCache>
@@ -246,9 +228,9 @@
           </c:errBars>
           <c:cat>
             <c:strRef>
-              <c:f>Sheet1!$B$2:$B$8</c:f>
+              <c:f>Sheet1!$B$2:$B$4</c:f>
               <c:strCache>
-                <c:ptCount val="7"/>
+                <c:ptCount val="3"/>
                 <c:pt idx="0">
                   <c:v>Fileserver A + Fileserver B, A is preferred</c:v>
                 </c:pt>
@@ -258,40 +240,22 @@
                 <c:pt idx="2">
                   <c:v>Fileserver A, alone</c:v>
                 </c:pt>
-                <c:pt idx="4">
-                  <c:v>Fileserver A + Fileserver B, A is preferred</c:v>
-                </c:pt>
-                <c:pt idx="5">
-                  <c:v>Fileserver A + Fileserver B, no preference</c:v>
-                </c:pt>
-                <c:pt idx="6">
-                  <c:v>Fileserver A, alone</c:v>
-                </c:pt>
               </c:strCache>
             </c:strRef>
           </c:cat>
           <c:val>
             <c:numRef>
-              <c:f>Sheet1!$C$2:$C$8</c:f>
+              <c:f>Sheet1!$C$2:$C$4</c:f>
               <c:numCache>
                 <c:formatCode>General</c:formatCode>
-                <c:ptCount val="7"/>
+                <c:ptCount val="3"/>
                 <c:pt idx="0">
-                  <c:v>1904.855278</c:v>
+                  <c:v>1472.7113890000001</c:v>
                 </c:pt>
                 <c:pt idx="1">
-                  <c:v>1227.2180559999999</c:v>
+                  <c:v>941.54666669999995</c:v>
                 </c:pt>
                 <c:pt idx="2">
-                  <c:v>2831.1577779999998</c:v>
-                </c:pt>
-                <c:pt idx="4">
-                  <c:v>1472.7113890000001</c:v>
-                </c:pt>
-                <c:pt idx="5">
-                  <c:v>941.54666669999995</c:v>
-                </c:pt>
-                <c:pt idx="6">
                   <c:v>2555.018333</c:v>
                 </c:pt>
               </c:numCache>
@@ -330,26 +294,17 @@
             <c:noEndCap val="0"/>
             <c:plus>
               <c:numRef>
-                <c:f>Sheet1!$I$2:$I$8</c:f>
+                <c:f>Sheet1!$H$2:$H$4</c:f>
                 <c:numCache>
                   <c:formatCode>General</c:formatCode>
-                  <c:ptCount val="7"/>
+                  <c:ptCount val="3"/>
                   <c:pt idx="0">
-                    <c:v>46.519010110000004</c:v>
+                    <c:v>25.918389650000002</c:v>
                   </c:pt>
                   <c:pt idx="1">
-                    <c:v>46.575578360000002</c:v>
+                    <c:v>56.659710339999997</c:v>
                   </c:pt>
                   <c:pt idx="2">
-                    <c:v>0</c:v>
-                  </c:pt>
-                  <c:pt idx="4">
-                    <c:v>25.918389650000002</c:v>
-                  </c:pt>
-                  <c:pt idx="5">
-                    <c:v>56.659710339999997</c:v>
-                  </c:pt>
-                  <c:pt idx="6">
                     <c:v>0</c:v>
                   </c:pt>
                 </c:numCache>
@@ -357,26 +312,17 @@
             </c:plus>
             <c:minus>
               <c:numRef>
-                <c:f>Sheet1!$I$2:$I$8</c:f>
+                <c:f>Sheet1!$H$2:$H$4</c:f>
                 <c:numCache>
                   <c:formatCode>General</c:formatCode>
-                  <c:ptCount val="7"/>
+                  <c:ptCount val="3"/>
                   <c:pt idx="0">
-                    <c:v>46.519010110000004</c:v>
+                    <c:v>25.918389650000002</c:v>
                   </c:pt>
                   <c:pt idx="1">
-                    <c:v>46.575578360000002</c:v>
+                    <c:v>56.659710339999997</c:v>
                   </c:pt>
                   <c:pt idx="2">
-                    <c:v>0</c:v>
-                  </c:pt>
-                  <c:pt idx="4">
-                    <c:v>25.918389650000002</c:v>
-                  </c:pt>
-                  <c:pt idx="5">
-                    <c:v>56.659710339999997</c:v>
-                  </c:pt>
-                  <c:pt idx="6">
                     <c:v>0</c:v>
                   </c:pt>
                 </c:numCache>
@@ -398,9 +344,9 @@
           </c:errBars>
           <c:cat>
             <c:strRef>
-              <c:f>Sheet1!$B$2:$B$8</c:f>
+              <c:f>Sheet1!$B$2:$B$4</c:f>
               <c:strCache>
-                <c:ptCount val="7"/>
+                <c:ptCount val="3"/>
                 <c:pt idx="0">
                   <c:v>Fileserver A + Fileserver B, A is preferred</c:v>
                 </c:pt>
@@ -410,40 +356,22 @@
                 <c:pt idx="2">
                   <c:v>Fileserver A, alone</c:v>
                 </c:pt>
-                <c:pt idx="4">
-                  <c:v>Fileserver A + Fileserver B, A is preferred</c:v>
-                </c:pt>
-                <c:pt idx="5">
-                  <c:v>Fileserver A + Fileserver B, no preference</c:v>
-                </c:pt>
-                <c:pt idx="6">
-                  <c:v>Fileserver A, alone</c:v>
-                </c:pt>
               </c:strCache>
             </c:strRef>
           </c:cat>
           <c:val>
             <c:numRef>
-              <c:f>Sheet1!$D$2:$D$8</c:f>
+              <c:f>Sheet1!$D$2:$D$4</c:f>
               <c:numCache>
                 <c:formatCode>General</c:formatCode>
-                <c:ptCount val="7"/>
+                <c:ptCount val="3"/>
                 <c:pt idx="0">
-                  <c:v>893.80499999999995</c:v>
+                  <c:v>807.45833330000005</c:v>
                 </c:pt>
                 <c:pt idx="1">
-                  <c:v>1227.6741669999999</c:v>
+                  <c:v>930.94916669999998</c:v>
                 </c:pt>
                 <c:pt idx="2">
-                  <c:v>0</c:v>
-                </c:pt>
-                <c:pt idx="4">
-                  <c:v>807.45833330000005</c:v>
-                </c:pt>
-                <c:pt idx="5">
-                  <c:v>930.94916669999998</c:v>
-                </c:pt>
-                <c:pt idx="6">
                   <c:v>0</c:v>
                 </c:pt>
               </c:numCache>
@@ -460,11 +388,11 @@
         </c:dLbls>
         <c:gapWidth val="20"/>
         <c:overlap val="100"/>
-        <c:axId val="-757827376"/>
-        <c:axId val="-757827920"/>
+        <c:axId val="-1539153232"/>
+        <c:axId val="-1539149968"/>
       </c:barChart>
       <c:catAx>
-        <c:axId val="-757827376"/>
+        <c:axId val="-1539153232"/>
         <c:scaling>
           <c:orientation val="minMax"/>
         </c:scaling>
@@ -507,7 +435,7 @@
             <a:endParaRPr lang="en-US"/>
           </a:p>
         </c:txPr>
-        <c:crossAx val="-757827920"/>
+        <c:crossAx val="-1539149968"/>
         <c:crosses val="autoZero"/>
         <c:auto val="1"/>
         <c:lblAlgn val="ctr"/>
@@ -515,7 +443,7 @@
         <c:noMultiLvlLbl val="1"/>
       </c:catAx>
       <c:valAx>
-        <c:axId val="-757827920"/>
+        <c:axId val="-1539149968"/>
         <c:scaling>
           <c:orientation val="minMax"/>
           <c:max val="3000"/>
@@ -569,7 +497,14 @@
               </a:p>
             </c:rich>
           </c:tx>
-          <c:layout/>
+          <c:layout>
+            <c:manualLayout>
+              <c:xMode val="edge"/>
+              <c:yMode val="edge"/>
+              <c:x val="0.6113864048120371"/>
+              <c:y val="0.82074174836791658"/>
+            </c:manualLayout>
+          </c:layout>
           <c:overlay val="0"/>
           <c:spPr>
             <a:noFill/>
@@ -632,7 +567,7 @@
             <a:endParaRPr lang="en-US"/>
           </a:p>
         </c:txPr>
-        <c:crossAx val="-757827376"/>
+        <c:crossAx val="-1539153232"/>
         <c:crosses val="autoZero"/>
         <c:crossBetween val="between"/>
         <c:majorUnit val="1000"/>
@@ -714,7 +649,555 @@
 </c:chartSpace>
 </file>
 
+<file path=ppt/charts/chart2.xml><?xml version="1.0" encoding="utf-8"?>
+<c:chartSpace xmlns:c="http://schemas.openxmlformats.org/drawingml/2006/chart" xmlns:a="http://schemas.openxmlformats.org/drawingml/2006/main" xmlns:r="http://schemas.openxmlformats.org/officeDocument/2006/relationships">
+  <c:date1904 val="0"/>
+  <c:lang val="en-US"/>
+  <c:roundedCorners val="0"/>
+  <mc:AlternateContent xmlns:mc="http://schemas.openxmlformats.org/markup-compatibility/2006">
+    <mc:Choice xmlns:c14="http://schemas.microsoft.com/office/drawing/2007/8/2/chart" Requires="c14">
+      <c14:style val="102"/>
+    </mc:Choice>
+    <mc:Fallback>
+      <c:style val="2"/>
+    </mc:Fallback>
+  </mc:AlternateContent>
+  <c:chart>
+    <c:autoTitleDeleted val="1"/>
+    <c:plotArea>
+      <c:layout>
+        <c:manualLayout>
+          <c:layoutTarget val="inner"/>
+          <c:xMode val="edge"/>
+          <c:yMode val="edge"/>
+          <c:x val="0.16711021930826847"/>
+          <c:y val="8.6653638155567161E-2"/>
+          <c:w val="0.51508571439348627"/>
+          <c:h val="0.69832579797233518"/>
+        </c:manualLayout>
+      </c:layout>
+      <c:lineChart>
+        <c:grouping val="standard"/>
+        <c:varyColors val="0"/>
+        <c:ser>
+          <c:idx val="0"/>
+          <c:order val="0"/>
+          <c:tx>
+            <c:strRef>
+              <c:f>Sheet1!$B$1</c:f>
+              <c:strCache>
+                <c:ptCount val="1"/>
+                <c:pt idx="0">
+                  <c:v>Copy Converter</c:v>
+                </c:pt>
+              </c:strCache>
+            </c:strRef>
+          </c:tx>
+          <c:spPr>
+            <a:ln w="101600" cap="rnd">
+              <a:solidFill>
+                <a:schemeClr val="accent6"/>
+              </a:solidFill>
+              <a:prstDash val="solid"/>
+              <a:round/>
+            </a:ln>
+            <a:effectLst/>
+          </c:spPr>
+          <c:marker>
+            <c:symbol val="square"/>
+            <c:size val="21"/>
+            <c:spPr>
+              <a:solidFill>
+                <a:schemeClr val="accent6"/>
+              </a:solidFill>
+              <a:ln w="9525">
+                <a:solidFill>
+                  <a:schemeClr val="accent6"/>
+                </a:solidFill>
+              </a:ln>
+              <a:effectLst/>
+            </c:spPr>
+          </c:marker>
+          <c:cat>
+            <c:strRef>
+              <c:f>Sheet1!$A$2:$A$5</c:f>
+              <c:strCache>
+                <c:ptCount val="4"/>
+                <c:pt idx="0">
+                  <c:v>20k</c:v>
+                </c:pt>
+                <c:pt idx="1">
+                  <c:v>5k</c:v>
+                </c:pt>
+                <c:pt idx="2">
+                  <c:v>1k</c:v>
+                </c:pt>
+                <c:pt idx="3">
+                  <c:v>100</c:v>
+                </c:pt>
+              </c:strCache>
+            </c:strRef>
+          </c:cat>
+          <c:val>
+            <c:numRef>
+              <c:f>Sheet1!$B$2:$B$5</c:f>
+              <c:numCache>
+                <c:formatCode>General</c:formatCode>
+                <c:ptCount val="4"/>
+                <c:pt idx="0">
+                  <c:v>188.17</c:v>
+                </c:pt>
+                <c:pt idx="1">
+                  <c:v>190.28</c:v>
+                </c:pt>
+                <c:pt idx="2">
+                  <c:v>192.74</c:v>
+                </c:pt>
+                <c:pt idx="3">
+                  <c:v>195.11</c:v>
+                </c:pt>
+              </c:numCache>
+            </c:numRef>
+          </c:val>
+          <c:smooth val="0"/>
+          <c:extLst xmlns:c16r2="http://schemas.microsoft.com/office/drawing/2015/06/chart">
+            <c:ext xmlns:c16="http://schemas.microsoft.com/office/drawing/2014/chart" uri="{C3380CC4-5D6E-409C-BE32-E72D297353CC}">
+              <c16:uniqueId val="{00000000-9CC1-4262-BF0E-2ECA5CEA12BB}"/>
+            </c:ext>
+          </c:extLst>
+        </c:ser>
+        <c:ser>
+          <c:idx val="2"/>
+          <c:order val="1"/>
+          <c:tx>
+            <c:strRef>
+              <c:f>Sheet1!$C$1</c:f>
+              <c:strCache>
+                <c:ptCount val="1"/>
+                <c:pt idx="0">
+                  <c:v>Spiffy Converter</c:v>
+                </c:pt>
+              </c:strCache>
+            </c:strRef>
+          </c:tx>
+          <c:spPr>
+            <a:ln w="101600" cap="rnd">
+              <a:solidFill>
+                <a:schemeClr val="accent1"/>
+              </a:solidFill>
+              <a:prstDash val="solid"/>
+              <a:round/>
+            </a:ln>
+            <a:effectLst/>
+          </c:spPr>
+          <c:marker>
+            <c:symbol val="diamond"/>
+            <c:size val="21"/>
+            <c:spPr>
+              <a:solidFill>
+                <a:schemeClr val="accent1"/>
+              </a:solidFill>
+              <a:ln w="127000">
+                <a:solidFill>
+                  <a:schemeClr val="accent1"/>
+                </a:solidFill>
+              </a:ln>
+              <a:effectLst/>
+            </c:spPr>
+          </c:marker>
+          <c:cat>
+            <c:strRef>
+              <c:f>Sheet1!$A$2:$A$5</c:f>
+              <c:strCache>
+                <c:ptCount val="4"/>
+                <c:pt idx="0">
+                  <c:v>20k</c:v>
+                </c:pt>
+                <c:pt idx="1">
+                  <c:v>5k</c:v>
+                </c:pt>
+                <c:pt idx="2">
+                  <c:v>1k</c:v>
+                </c:pt>
+                <c:pt idx="3">
+                  <c:v>100</c:v>
+                </c:pt>
+              </c:strCache>
+            </c:strRef>
+          </c:cat>
+          <c:val>
+            <c:numRef>
+              <c:f>Sheet1!$C$2:$C$5</c:f>
+              <c:numCache>
+                <c:formatCode>0.00</c:formatCode>
+                <c:ptCount val="4"/>
+                <c:pt idx="0">
+                  <c:v>7.03</c:v>
+                </c:pt>
+                <c:pt idx="1">
+                  <c:v>4.01</c:v>
+                </c:pt>
+                <c:pt idx="2">
+                  <c:v>3.84</c:v>
+                </c:pt>
+                <c:pt idx="3">
+                  <c:v>3.71</c:v>
+                </c:pt>
+              </c:numCache>
+            </c:numRef>
+          </c:val>
+          <c:smooth val="0"/>
+          <c:extLst xmlns:c16r2="http://schemas.microsoft.com/office/drawing/2015/06/chart">
+            <c:ext xmlns:c16="http://schemas.microsoft.com/office/drawing/2014/chart" uri="{C3380CC4-5D6E-409C-BE32-E72D297353CC}">
+              <c16:uniqueId val="{00000002-9CC1-4262-BF0E-2ECA5CEA12BB}"/>
+            </c:ext>
+          </c:extLst>
+        </c:ser>
+        <c:dLbls>
+          <c:showLegendKey val="0"/>
+          <c:showVal val="0"/>
+          <c:showCatName val="0"/>
+          <c:showSerName val="0"/>
+          <c:showPercent val="0"/>
+          <c:showBubbleSize val="0"/>
+        </c:dLbls>
+        <c:marker val="1"/>
+        <c:smooth val="0"/>
+        <c:axId val="-1532879600"/>
+        <c:axId val="-1532869264"/>
+      </c:lineChart>
+      <c:catAx>
+        <c:axId val="-1532879600"/>
+        <c:scaling>
+          <c:orientation val="minMax"/>
+        </c:scaling>
+        <c:delete val="0"/>
+        <c:axPos val="b"/>
+        <c:title>
+          <c:tx>
+            <c:rich>
+              <a:bodyPr rot="0" spcFirstLastPara="1" vertOverflow="ellipsis" vert="horz" wrap="square" anchor="ctr" anchorCtr="1"/>
+              <a:lstStyle/>
+              <a:p>
+                <a:pPr>
+                  <a:defRPr sz="4400" b="0" i="0" u="none" strike="noStrike" kern="1200" baseline="0">
+                    <a:solidFill>
+                      <a:schemeClr val="tx1"/>
+                    </a:solidFill>
+                    <a:latin typeface="+mn-lt"/>
+                    <a:ea typeface="+mn-ea"/>
+                    <a:cs typeface="+mn-cs"/>
+                  </a:defRPr>
+                </a:pPr>
+                <a:r>
+                  <a:rPr lang="en-US"/>
+                  <a:t># of files</a:t>
+                </a:r>
+              </a:p>
+            </c:rich>
+          </c:tx>
+          <c:layout>
+            <c:manualLayout>
+              <c:xMode val="edge"/>
+              <c:yMode val="edge"/>
+              <c:x val="0.67823960753457269"/>
+              <c:y val="0.84976580319908024"/>
+            </c:manualLayout>
+          </c:layout>
+          <c:overlay val="0"/>
+          <c:spPr>
+            <a:noFill/>
+            <a:ln>
+              <a:noFill/>
+            </a:ln>
+            <a:effectLst/>
+          </c:spPr>
+          <c:txPr>
+            <a:bodyPr rot="0" spcFirstLastPara="1" vertOverflow="ellipsis" vert="horz" wrap="square" anchor="ctr" anchorCtr="1"/>
+            <a:lstStyle/>
+            <a:p>
+              <a:pPr>
+                <a:defRPr sz="4400" b="0" i="0" u="none" strike="noStrike" kern="1200" baseline="0">
+                  <a:solidFill>
+                    <a:schemeClr val="tx1"/>
+                  </a:solidFill>
+                  <a:latin typeface="+mn-lt"/>
+                  <a:ea typeface="+mn-ea"/>
+                  <a:cs typeface="+mn-cs"/>
+                </a:defRPr>
+              </a:pPr>
+              <a:endParaRPr lang="en-US"/>
+            </a:p>
+          </c:txPr>
+        </c:title>
+        <c:numFmt formatCode="General" sourceLinked="1"/>
+        <c:majorTickMark val="none"/>
+        <c:minorTickMark val="none"/>
+        <c:tickLblPos val="nextTo"/>
+        <c:spPr>
+          <a:noFill/>
+          <a:ln w="9525" cap="flat" cmpd="sng" algn="ctr">
+            <a:solidFill>
+              <a:schemeClr val="bg2">
+                <a:lumMod val="10000"/>
+              </a:schemeClr>
+            </a:solidFill>
+            <a:round/>
+          </a:ln>
+          <a:effectLst/>
+        </c:spPr>
+        <c:txPr>
+          <a:bodyPr rot="-60000000" spcFirstLastPara="1" vertOverflow="ellipsis" vert="horz" wrap="square" anchor="ctr" anchorCtr="1"/>
+          <a:lstStyle/>
+          <a:p>
+            <a:pPr>
+              <a:defRPr sz="4400" b="0" i="0" u="none" strike="noStrike" kern="1200" baseline="0">
+                <a:solidFill>
+                  <a:schemeClr val="tx1"/>
+                </a:solidFill>
+                <a:latin typeface="+mn-lt"/>
+                <a:ea typeface="+mn-ea"/>
+                <a:cs typeface="+mn-cs"/>
+              </a:defRPr>
+            </a:pPr>
+            <a:endParaRPr lang="en-US"/>
+          </a:p>
+        </c:txPr>
+        <c:crossAx val="-1532869264"/>
+        <c:crosses val="autoZero"/>
+        <c:auto val="0"/>
+        <c:lblAlgn val="ctr"/>
+        <c:lblOffset val="100"/>
+        <c:noMultiLvlLbl val="0"/>
+      </c:catAx>
+      <c:valAx>
+        <c:axId val="-1532869264"/>
+        <c:scaling>
+          <c:logBase val="4"/>
+          <c:orientation val="minMax"/>
+        </c:scaling>
+        <c:delete val="0"/>
+        <c:axPos val="l"/>
+        <c:majorGridlines>
+          <c:spPr>
+            <a:ln w="9525" cap="flat" cmpd="sng" algn="ctr">
+              <a:solidFill>
+                <a:schemeClr val="tx1">
+                  <a:lumMod val="50000"/>
+                </a:schemeClr>
+              </a:solidFill>
+              <a:round/>
+            </a:ln>
+            <a:effectLst/>
+          </c:spPr>
+        </c:majorGridlines>
+        <c:title>
+          <c:tx>
+            <c:rich>
+              <a:bodyPr rot="-5400000" spcFirstLastPara="1" vertOverflow="ellipsis" vert="horz" wrap="square" anchor="ctr" anchorCtr="1"/>
+              <a:lstStyle/>
+              <a:p>
+                <a:pPr>
+                  <a:defRPr sz="4400" b="0" i="0" u="none" strike="noStrike" kern="1200" baseline="0">
+                    <a:solidFill>
+                      <a:schemeClr val="tx1"/>
+                    </a:solidFill>
+                    <a:latin typeface="+mn-lt"/>
+                    <a:ea typeface="+mn-ea"/>
+                    <a:cs typeface="+mn-cs"/>
+                  </a:defRPr>
+                </a:pPr>
+                <a:r>
+                  <a:rPr lang="en-CA" dirty="0" smtClean="0"/>
+                  <a:t>seconds</a:t>
+                </a:r>
+                <a:endParaRPr lang="en-CA" dirty="0"/>
+              </a:p>
+            </c:rich>
+          </c:tx>
+          <c:layout/>
+          <c:overlay val="0"/>
+          <c:spPr>
+            <a:noFill/>
+            <a:ln>
+              <a:noFill/>
+            </a:ln>
+            <a:effectLst/>
+          </c:spPr>
+          <c:txPr>
+            <a:bodyPr rot="-5400000" spcFirstLastPara="1" vertOverflow="ellipsis" vert="horz" wrap="square" anchor="ctr" anchorCtr="1"/>
+            <a:lstStyle/>
+            <a:p>
+              <a:pPr>
+                <a:defRPr sz="4400" b="0" i="0" u="none" strike="noStrike" kern="1200" baseline="0">
+                  <a:solidFill>
+                    <a:schemeClr val="tx1"/>
+                  </a:solidFill>
+                  <a:latin typeface="+mn-lt"/>
+                  <a:ea typeface="+mn-ea"/>
+                  <a:cs typeface="+mn-cs"/>
+                </a:defRPr>
+              </a:pPr>
+              <a:endParaRPr lang="en-US"/>
+            </a:p>
+          </c:txPr>
+        </c:title>
+        <c:numFmt formatCode="General" sourceLinked="1"/>
+        <c:majorTickMark val="none"/>
+        <c:minorTickMark val="none"/>
+        <c:tickLblPos val="nextTo"/>
+        <c:spPr>
+          <a:noFill/>
+          <a:ln>
+            <a:noFill/>
+          </a:ln>
+          <a:effectLst/>
+        </c:spPr>
+        <c:txPr>
+          <a:bodyPr rot="-60000000" spcFirstLastPara="1" vertOverflow="ellipsis" vert="horz" wrap="square" anchor="ctr" anchorCtr="1"/>
+          <a:lstStyle/>
+          <a:p>
+            <a:pPr>
+              <a:defRPr sz="4400" b="0" i="0" u="none" strike="noStrike" kern="1200" baseline="0">
+                <a:solidFill>
+                  <a:schemeClr val="tx1"/>
+                </a:solidFill>
+                <a:latin typeface="+mn-lt"/>
+                <a:ea typeface="+mn-ea"/>
+                <a:cs typeface="+mn-cs"/>
+              </a:defRPr>
+            </a:pPr>
+            <a:endParaRPr lang="en-US"/>
+          </a:p>
+        </c:txPr>
+        <c:crossAx val="-1532879600"/>
+        <c:crosses val="autoZero"/>
+        <c:crossBetween val="between"/>
+      </c:valAx>
+      <c:spPr>
+        <a:solidFill>
+          <a:schemeClr val="bg1"/>
+        </a:solidFill>
+        <a:ln>
+          <a:solidFill>
+            <a:schemeClr val="tx1">
+              <a:lumMod val="50000"/>
+            </a:schemeClr>
+          </a:solidFill>
+        </a:ln>
+        <a:effectLst/>
+      </c:spPr>
+    </c:plotArea>
+    <c:legend>
+      <c:legendPos val="r"/>
+      <c:layout>
+        <c:manualLayout>
+          <c:xMode val="edge"/>
+          <c:yMode val="edge"/>
+          <c:x val="0.67818129206051214"/>
+          <c:y val="6.2656221942713725E-2"/>
+          <c:w val="0.32181870793948791"/>
+          <c:h val="0.64145139331892442"/>
+        </c:manualLayout>
+      </c:layout>
+      <c:overlay val="0"/>
+      <c:spPr>
+        <a:noFill/>
+        <a:ln>
+          <a:noFill/>
+        </a:ln>
+        <a:effectLst/>
+      </c:spPr>
+      <c:txPr>
+        <a:bodyPr rot="0" spcFirstLastPara="1" vertOverflow="ellipsis" vert="horz" wrap="square" anchor="ctr" anchorCtr="1"/>
+        <a:lstStyle/>
+        <a:p>
+          <a:pPr>
+            <a:defRPr sz="4400" b="0" i="0" u="none" strike="noStrike" kern="1200" baseline="0">
+              <a:solidFill>
+                <a:schemeClr val="tx1"/>
+              </a:solidFill>
+              <a:latin typeface="+mn-lt"/>
+              <a:ea typeface="+mn-ea"/>
+              <a:cs typeface="+mn-cs"/>
+            </a:defRPr>
+          </a:pPr>
+          <a:endParaRPr lang="en-US"/>
+        </a:p>
+      </c:txPr>
+    </c:legend>
+    <c:plotVisOnly val="1"/>
+    <c:dispBlanksAs val="gap"/>
+    <c:showDLblsOverMax val="0"/>
+  </c:chart>
+  <c:spPr>
+    <a:noFill/>
+    <a:ln>
+      <a:noFill/>
+    </a:ln>
+    <a:effectLst/>
+  </c:spPr>
+  <c:txPr>
+    <a:bodyPr/>
+    <a:lstStyle/>
+    <a:p>
+      <a:pPr>
+        <a:defRPr sz="4400">
+          <a:solidFill>
+            <a:schemeClr val="tx1"/>
+          </a:solidFill>
+        </a:defRPr>
+      </a:pPr>
+      <a:endParaRPr lang="en-US"/>
+    </a:p>
+  </c:txPr>
+  <c:externalData r:id="rId3">
+    <c:autoUpdate val="0"/>
+  </c:externalData>
+</c:chartSpace>
+</file>
+
 <file path=ppt/charts/colors1.xml><?xml version="1.0" encoding="utf-8"?>
+<cs:colorStyle xmlns:cs="http://schemas.microsoft.com/office/drawing/2012/chartStyle" xmlns:a="http://schemas.openxmlformats.org/drawingml/2006/main" meth="cycle" id="10">
+  <a:schemeClr val="accent1"/>
+  <a:schemeClr val="accent2"/>
+  <a:schemeClr val="accent3"/>
+  <a:schemeClr val="accent4"/>
+  <a:schemeClr val="accent5"/>
+  <a:schemeClr val="accent6"/>
+  <cs:variation/>
+  <cs:variation>
+    <a:lumMod val="60000"/>
+  </cs:variation>
+  <cs:variation>
+    <a:lumMod val="80000"/>
+    <a:lumOff val="20000"/>
+  </cs:variation>
+  <cs:variation>
+    <a:lumMod val="80000"/>
+  </cs:variation>
+  <cs:variation>
+    <a:lumMod val="60000"/>
+    <a:lumOff val="40000"/>
+  </cs:variation>
+  <cs:variation>
+    <a:lumMod val="50000"/>
+  </cs:variation>
+  <cs:variation>
+    <a:lumMod val="70000"/>
+    <a:lumOff val="30000"/>
+  </cs:variation>
+  <cs:variation>
+    <a:lumMod val="70000"/>
+  </cs:variation>
+  <cs:variation>
+    <a:lumMod val="50000"/>
+    <a:lumOff val="50000"/>
+  </cs:variation>
+</cs:colorStyle>
+</file>
+
+<file path=ppt/charts/colors2.xml><?xml version="1.0" encoding="utf-8"?>
 <cs:colorStyle xmlns:cs="http://schemas.microsoft.com/office/drawing/2012/chartStyle" xmlns:a="http://schemas.openxmlformats.org/drawingml/2006/main" meth="cycle" id="10">
   <a:schemeClr val="accent1"/>
   <a:schemeClr val="accent2"/>
@@ -1259,6 +1742,522 @@
 </cs:chartStyle>
 </file>
 
+<file path=ppt/charts/style2.xml><?xml version="1.0" encoding="utf-8"?>
+<cs:chartStyle xmlns:cs="http://schemas.microsoft.com/office/drawing/2012/chartStyle" xmlns:a="http://schemas.openxmlformats.org/drawingml/2006/main" id="227">
+  <cs:axisTitle>
+    <cs:lnRef idx="0"/>
+    <cs:fillRef idx="0"/>
+    <cs:effectRef idx="0"/>
+    <cs:fontRef idx="minor">
+      <a:schemeClr val="tx1">
+        <a:lumMod val="65000"/>
+        <a:lumOff val="35000"/>
+      </a:schemeClr>
+    </cs:fontRef>
+    <cs:defRPr sz="1000" kern="1200"/>
+  </cs:axisTitle>
+  <cs:categoryAxis>
+    <cs:lnRef idx="0"/>
+    <cs:fillRef idx="0"/>
+    <cs:effectRef idx="0"/>
+    <cs:fontRef idx="minor">
+      <a:schemeClr val="tx1">
+        <a:lumMod val="65000"/>
+        <a:lumOff val="35000"/>
+      </a:schemeClr>
+    </cs:fontRef>
+    <cs:spPr>
+      <a:ln w="9525" cap="flat" cmpd="sng" algn="ctr">
+        <a:solidFill>
+          <a:schemeClr val="tx1">
+            <a:lumMod val="15000"/>
+            <a:lumOff val="85000"/>
+          </a:schemeClr>
+        </a:solidFill>
+        <a:round/>
+      </a:ln>
+    </cs:spPr>
+    <cs:defRPr sz="900" kern="1200"/>
+  </cs:categoryAxis>
+  <cs:chartArea mods="allowNoFillOverride allowNoLineOverride">
+    <cs:lnRef idx="0"/>
+    <cs:fillRef idx="0"/>
+    <cs:effectRef idx="0"/>
+    <cs:fontRef idx="minor">
+      <a:schemeClr val="tx1"/>
+    </cs:fontRef>
+    <cs:spPr>
+      <a:solidFill>
+        <a:schemeClr val="bg1"/>
+      </a:solidFill>
+      <a:ln w="9525" cap="flat" cmpd="sng" algn="ctr">
+        <a:solidFill>
+          <a:schemeClr val="tx1">
+            <a:lumMod val="15000"/>
+            <a:lumOff val="85000"/>
+          </a:schemeClr>
+        </a:solidFill>
+        <a:round/>
+      </a:ln>
+    </cs:spPr>
+    <cs:defRPr sz="1000" kern="1200"/>
+  </cs:chartArea>
+  <cs:dataLabel>
+    <cs:lnRef idx="0"/>
+    <cs:fillRef idx="0"/>
+    <cs:effectRef idx="0"/>
+    <cs:fontRef idx="minor">
+      <a:schemeClr val="tx1">
+        <a:lumMod val="75000"/>
+        <a:lumOff val="25000"/>
+      </a:schemeClr>
+    </cs:fontRef>
+    <cs:defRPr sz="900" kern="1200"/>
+  </cs:dataLabel>
+  <cs:dataLabelCallout>
+    <cs:lnRef idx="0"/>
+    <cs:fillRef idx="0"/>
+    <cs:effectRef idx="0"/>
+    <cs:fontRef idx="minor">
+      <a:schemeClr val="dk1">
+        <a:lumMod val="65000"/>
+        <a:lumOff val="35000"/>
+      </a:schemeClr>
+    </cs:fontRef>
+    <cs:spPr>
+      <a:solidFill>
+        <a:schemeClr val="lt1"/>
+      </a:solidFill>
+      <a:ln>
+        <a:solidFill>
+          <a:schemeClr val="dk1">
+            <a:lumMod val="25000"/>
+            <a:lumOff val="75000"/>
+          </a:schemeClr>
+        </a:solidFill>
+      </a:ln>
+    </cs:spPr>
+    <cs:defRPr sz="900" kern="1200"/>
+    <cs:bodyPr rot="0" spcFirstLastPara="1" vertOverflow="clip" horzOverflow="clip" vert="horz" wrap="square" lIns="36576" tIns="18288" rIns="36576" bIns="18288" anchor="ctr" anchorCtr="1">
+      <a:spAutoFit/>
+    </cs:bodyPr>
+  </cs:dataLabelCallout>
+  <cs:dataPoint>
+    <cs:lnRef idx="0"/>
+    <cs:fillRef idx="1">
+      <cs:styleClr val="auto"/>
+    </cs:fillRef>
+    <cs:effectRef idx="0"/>
+    <cs:fontRef idx="minor">
+      <a:schemeClr val="tx1"/>
+    </cs:fontRef>
+    <cs:spPr>
+      <a:solidFill>
+        <a:schemeClr val="phClr"/>
+      </a:solidFill>
+    </cs:spPr>
+  </cs:dataPoint>
+  <cs:dataPoint3D>
+    <cs:lnRef idx="0"/>
+    <cs:fillRef idx="1">
+      <cs:styleClr val="auto"/>
+    </cs:fillRef>
+    <cs:effectRef idx="0"/>
+    <cs:fontRef idx="minor">
+      <a:schemeClr val="tx1"/>
+    </cs:fontRef>
+    <cs:spPr>
+      <a:solidFill>
+        <a:schemeClr val="phClr"/>
+      </a:solidFill>
+    </cs:spPr>
+  </cs:dataPoint3D>
+  <cs:dataPointLine>
+    <cs:lnRef idx="0">
+      <cs:styleClr val="auto"/>
+    </cs:lnRef>
+    <cs:fillRef idx="1"/>
+    <cs:effectRef idx="0"/>
+    <cs:fontRef idx="minor">
+      <a:schemeClr val="tx1"/>
+    </cs:fontRef>
+    <cs:spPr>
+      <a:ln w="28575" cap="rnd">
+        <a:solidFill>
+          <a:schemeClr val="phClr"/>
+        </a:solidFill>
+        <a:round/>
+      </a:ln>
+    </cs:spPr>
+  </cs:dataPointLine>
+  <cs:dataPointMarker>
+    <cs:lnRef idx="0">
+      <cs:styleClr val="auto"/>
+    </cs:lnRef>
+    <cs:fillRef idx="1">
+      <cs:styleClr val="auto"/>
+    </cs:fillRef>
+    <cs:effectRef idx="0"/>
+    <cs:fontRef idx="minor">
+      <a:schemeClr val="tx1"/>
+    </cs:fontRef>
+    <cs:spPr>
+      <a:solidFill>
+        <a:schemeClr val="phClr"/>
+      </a:solidFill>
+      <a:ln w="9525">
+        <a:solidFill>
+          <a:schemeClr val="phClr"/>
+        </a:solidFill>
+      </a:ln>
+    </cs:spPr>
+  </cs:dataPointMarker>
+  <cs:dataPointMarkerLayout symbol="circle" size="5"/>
+  <cs:dataPointWireframe>
+    <cs:lnRef idx="0">
+      <cs:styleClr val="auto"/>
+    </cs:lnRef>
+    <cs:fillRef idx="1"/>
+    <cs:effectRef idx="0"/>
+    <cs:fontRef idx="minor">
+      <a:schemeClr val="tx1"/>
+    </cs:fontRef>
+    <cs:spPr>
+      <a:ln w="9525" cap="rnd">
+        <a:solidFill>
+          <a:schemeClr val="phClr"/>
+        </a:solidFill>
+        <a:round/>
+      </a:ln>
+    </cs:spPr>
+  </cs:dataPointWireframe>
+  <cs:dataTable>
+    <cs:lnRef idx="0"/>
+    <cs:fillRef idx="0"/>
+    <cs:effectRef idx="0"/>
+    <cs:fontRef idx="minor">
+      <a:schemeClr val="tx1">
+        <a:lumMod val="65000"/>
+        <a:lumOff val="35000"/>
+      </a:schemeClr>
+    </cs:fontRef>
+    <cs:spPr>
+      <a:noFill/>
+      <a:ln w="9525" cap="flat" cmpd="sng" algn="ctr">
+        <a:solidFill>
+          <a:schemeClr val="tx1">
+            <a:lumMod val="15000"/>
+            <a:lumOff val="85000"/>
+          </a:schemeClr>
+        </a:solidFill>
+        <a:round/>
+      </a:ln>
+    </cs:spPr>
+    <cs:defRPr sz="900" kern="1200"/>
+  </cs:dataTable>
+  <cs:downBar>
+    <cs:lnRef idx="0"/>
+    <cs:fillRef idx="0"/>
+    <cs:effectRef idx="0"/>
+    <cs:fontRef idx="minor">
+      <a:schemeClr val="dk1"/>
+    </cs:fontRef>
+    <cs:spPr>
+      <a:solidFill>
+        <a:schemeClr val="dk1">
+          <a:lumMod val="65000"/>
+          <a:lumOff val="35000"/>
+        </a:schemeClr>
+      </a:solidFill>
+      <a:ln w="9525">
+        <a:solidFill>
+          <a:schemeClr val="tx1">
+            <a:lumMod val="65000"/>
+            <a:lumOff val="35000"/>
+          </a:schemeClr>
+        </a:solidFill>
+      </a:ln>
+    </cs:spPr>
+  </cs:downBar>
+  <cs:dropLine>
+    <cs:lnRef idx="0"/>
+    <cs:fillRef idx="0"/>
+    <cs:effectRef idx="0"/>
+    <cs:fontRef idx="minor">
+      <a:schemeClr val="tx1"/>
+    </cs:fontRef>
+    <cs:spPr>
+      <a:ln w="9525" cap="flat" cmpd="sng" algn="ctr">
+        <a:solidFill>
+          <a:schemeClr val="tx1">
+            <a:lumMod val="35000"/>
+            <a:lumOff val="65000"/>
+          </a:schemeClr>
+        </a:solidFill>
+        <a:round/>
+      </a:ln>
+    </cs:spPr>
+  </cs:dropLine>
+  <cs:errorBar>
+    <cs:lnRef idx="0"/>
+    <cs:fillRef idx="0"/>
+    <cs:effectRef idx="0"/>
+    <cs:fontRef idx="minor">
+      <a:schemeClr val="tx1"/>
+    </cs:fontRef>
+    <cs:spPr>
+      <a:ln w="9525" cap="flat" cmpd="sng" algn="ctr">
+        <a:solidFill>
+          <a:schemeClr val="tx1">
+            <a:lumMod val="65000"/>
+            <a:lumOff val="35000"/>
+          </a:schemeClr>
+        </a:solidFill>
+        <a:round/>
+      </a:ln>
+    </cs:spPr>
+  </cs:errorBar>
+  <cs:floor>
+    <cs:lnRef idx="0"/>
+    <cs:fillRef idx="0"/>
+    <cs:effectRef idx="0"/>
+    <cs:fontRef idx="minor">
+      <a:schemeClr val="tx1"/>
+    </cs:fontRef>
+    <cs:spPr>
+      <a:noFill/>
+      <a:ln>
+        <a:noFill/>
+      </a:ln>
+    </cs:spPr>
+  </cs:floor>
+  <cs:gridlineMajor>
+    <cs:lnRef idx="0"/>
+    <cs:fillRef idx="0"/>
+    <cs:effectRef idx="0"/>
+    <cs:fontRef idx="minor">
+      <a:schemeClr val="tx1"/>
+    </cs:fontRef>
+    <cs:spPr>
+      <a:ln w="9525" cap="flat" cmpd="sng" algn="ctr">
+        <a:solidFill>
+          <a:schemeClr val="tx1">
+            <a:lumMod val="15000"/>
+            <a:lumOff val="85000"/>
+          </a:schemeClr>
+        </a:solidFill>
+        <a:round/>
+      </a:ln>
+    </cs:spPr>
+  </cs:gridlineMajor>
+  <cs:gridlineMinor>
+    <cs:lnRef idx="0"/>
+    <cs:fillRef idx="0"/>
+    <cs:effectRef idx="0"/>
+    <cs:fontRef idx="minor">
+      <a:schemeClr val="tx1"/>
+    </cs:fontRef>
+    <cs:spPr>
+      <a:ln w="9525" cap="flat" cmpd="sng" algn="ctr">
+        <a:solidFill>
+          <a:schemeClr val="tx1">
+            <a:lumMod val="5000"/>
+            <a:lumOff val="95000"/>
+          </a:schemeClr>
+        </a:solidFill>
+        <a:round/>
+      </a:ln>
+    </cs:spPr>
+  </cs:gridlineMinor>
+  <cs:hiLoLine>
+    <cs:lnRef idx="0"/>
+    <cs:fillRef idx="0"/>
+    <cs:effectRef idx="0"/>
+    <cs:fontRef idx="minor">
+      <a:schemeClr val="tx1"/>
+    </cs:fontRef>
+    <cs:spPr>
+      <a:ln w="9525" cap="flat" cmpd="sng" algn="ctr">
+        <a:solidFill>
+          <a:schemeClr val="tx1">
+            <a:lumMod val="75000"/>
+            <a:lumOff val="25000"/>
+          </a:schemeClr>
+        </a:solidFill>
+        <a:round/>
+      </a:ln>
+    </cs:spPr>
+  </cs:hiLoLine>
+  <cs:leaderLine>
+    <cs:lnRef idx="0"/>
+    <cs:fillRef idx="0"/>
+    <cs:effectRef idx="0"/>
+    <cs:fontRef idx="minor">
+      <a:schemeClr val="tx1"/>
+    </cs:fontRef>
+    <cs:spPr>
+      <a:ln w="9525" cap="flat" cmpd="sng" algn="ctr">
+        <a:solidFill>
+          <a:schemeClr val="tx1">
+            <a:lumMod val="35000"/>
+            <a:lumOff val="65000"/>
+          </a:schemeClr>
+        </a:solidFill>
+        <a:round/>
+      </a:ln>
+    </cs:spPr>
+  </cs:leaderLine>
+  <cs:legend>
+    <cs:lnRef idx="0"/>
+    <cs:fillRef idx="0"/>
+    <cs:effectRef idx="0"/>
+    <cs:fontRef idx="minor">
+      <a:schemeClr val="tx1">
+        <a:lumMod val="65000"/>
+        <a:lumOff val="35000"/>
+      </a:schemeClr>
+    </cs:fontRef>
+    <cs:defRPr sz="900" kern="1200"/>
+  </cs:legend>
+  <cs:plotArea mods="allowNoFillOverride allowNoLineOverride">
+    <cs:lnRef idx="0"/>
+    <cs:fillRef idx="0"/>
+    <cs:effectRef idx="0"/>
+    <cs:fontRef idx="minor">
+      <a:schemeClr val="tx1"/>
+    </cs:fontRef>
+  </cs:plotArea>
+  <cs:plotArea3D mods="allowNoFillOverride allowNoLineOverride">
+    <cs:lnRef idx="0"/>
+    <cs:fillRef idx="0"/>
+    <cs:effectRef idx="0"/>
+    <cs:fontRef idx="minor">
+      <a:schemeClr val="tx1"/>
+    </cs:fontRef>
+  </cs:plotArea3D>
+  <cs:seriesAxis>
+    <cs:lnRef idx="0"/>
+    <cs:fillRef idx="0"/>
+    <cs:effectRef idx="0"/>
+    <cs:fontRef idx="minor">
+      <a:schemeClr val="tx1">
+        <a:lumMod val="65000"/>
+        <a:lumOff val="35000"/>
+      </a:schemeClr>
+    </cs:fontRef>
+    <cs:defRPr sz="900" kern="1200"/>
+  </cs:seriesAxis>
+  <cs:seriesLine>
+    <cs:lnRef idx="0"/>
+    <cs:fillRef idx="0"/>
+    <cs:effectRef idx="0"/>
+    <cs:fontRef idx="minor">
+      <a:schemeClr val="tx1"/>
+    </cs:fontRef>
+    <cs:spPr>
+      <a:ln w="9525" cap="flat" cmpd="sng" algn="ctr">
+        <a:solidFill>
+          <a:schemeClr val="tx1">
+            <a:lumMod val="35000"/>
+            <a:lumOff val="65000"/>
+          </a:schemeClr>
+        </a:solidFill>
+        <a:round/>
+      </a:ln>
+    </cs:spPr>
+  </cs:seriesLine>
+  <cs:title>
+    <cs:lnRef idx="0"/>
+    <cs:fillRef idx="0"/>
+    <cs:effectRef idx="0"/>
+    <cs:fontRef idx="minor">
+      <a:schemeClr val="tx1">
+        <a:lumMod val="65000"/>
+        <a:lumOff val="35000"/>
+      </a:schemeClr>
+    </cs:fontRef>
+    <cs:defRPr sz="1400" b="0" kern="1200" spc="0" baseline="0"/>
+  </cs:title>
+  <cs:trendline>
+    <cs:lnRef idx="0">
+      <cs:styleClr val="auto"/>
+    </cs:lnRef>
+    <cs:fillRef idx="0"/>
+    <cs:effectRef idx="0"/>
+    <cs:fontRef idx="minor">
+      <a:schemeClr val="tx1"/>
+    </cs:fontRef>
+    <cs:spPr>
+      <a:ln w="19050" cap="rnd">
+        <a:solidFill>
+          <a:schemeClr val="phClr"/>
+        </a:solidFill>
+        <a:prstDash val="sysDot"/>
+      </a:ln>
+    </cs:spPr>
+  </cs:trendline>
+  <cs:trendlineLabel>
+    <cs:lnRef idx="0"/>
+    <cs:fillRef idx="0"/>
+    <cs:effectRef idx="0"/>
+    <cs:fontRef idx="minor">
+      <a:schemeClr val="tx1">
+        <a:lumMod val="65000"/>
+        <a:lumOff val="35000"/>
+      </a:schemeClr>
+    </cs:fontRef>
+    <cs:defRPr sz="900" kern="1200"/>
+  </cs:trendlineLabel>
+  <cs:upBar>
+    <cs:lnRef idx="0"/>
+    <cs:fillRef idx="0"/>
+    <cs:effectRef idx="0"/>
+    <cs:fontRef idx="minor">
+      <a:schemeClr val="dk1"/>
+    </cs:fontRef>
+    <cs:spPr>
+      <a:solidFill>
+        <a:schemeClr val="lt1"/>
+      </a:solidFill>
+      <a:ln w="9525">
+        <a:solidFill>
+          <a:schemeClr val="tx1">
+            <a:lumMod val="15000"/>
+            <a:lumOff val="85000"/>
+          </a:schemeClr>
+        </a:solidFill>
+      </a:ln>
+    </cs:spPr>
+  </cs:upBar>
+  <cs:valueAxis>
+    <cs:lnRef idx="0"/>
+    <cs:fillRef idx="0"/>
+    <cs:effectRef idx="0"/>
+    <cs:fontRef idx="minor">
+      <a:schemeClr val="tx1">
+        <a:lumMod val="65000"/>
+        <a:lumOff val="35000"/>
+      </a:schemeClr>
+    </cs:fontRef>
+    <cs:defRPr sz="900" kern="1200"/>
+  </cs:valueAxis>
+  <cs:wall>
+    <cs:lnRef idx="0"/>
+    <cs:fillRef idx="0"/>
+    <cs:effectRef idx="0"/>
+    <cs:fontRef idx="minor">
+      <a:schemeClr val="tx1"/>
+    </cs:fontRef>
+    <cs:spPr>
+      <a:noFill/>
+      <a:ln>
+        <a:noFill/>
+      </a:ln>
+    </cs:spPr>
+  </cs:wall>
+</cs:chartStyle>
+</file>
+
 <file path=ppt/notesMasters/notesMaster1.xml><?xml version="1.0" encoding="utf-8"?>
 <p:notesMaster xmlns:a="http://schemas.openxmlformats.org/drawingml/2006/main" xmlns:r="http://schemas.openxmlformats.org/officeDocument/2006/relationships" xmlns:p="http://schemas.openxmlformats.org/presentationml/2006/main">
   <p:cSld>
@@ -1341,7 +2340,7 @@
           <a:p>
             <a:fld id="{C9DC1324-E310-4A65-873D-9503C394914C}" type="datetimeFigureOut">
               <a:rPr lang="en-CA" smtClean="0"/>
-              <a:t>2018-02-10</a:t>
+              <a:t>2018-02-11</a:t>
             </a:fld>
             <a:endParaRPr lang="en-CA"/>
           </a:p>
@@ -2804,7 +3803,7 @@
             <a:fld id="{14F78747-2AEC-4AEC-BEAC-18205FB8368B}" type="datetime1">
               <a:rPr lang="en-US" smtClean="0"/>
               <a:pPr lvl="0"/>
-              <a:t>2/10/2018</a:t>
+              <a:t>2/11/2018</a:t>
             </a:fld>
             <a:endParaRPr lang="en-US"/>
           </a:p>
@@ -3438,14 +4437,14 @@
           <p:nvPr>
             <p:extLst>
               <p:ext uri="{D42A27DB-BD31-4B8C-83A1-F6EECF244321}">
-                <p14:modId xmlns:p14="http://schemas.microsoft.com/office/powerpoint/2010/main" val="145693337"/>
+                <p14:modId xmlns:p14="http://schemas.microsoft.com/office/powerpoint/2010/main" val="1590370223"/>
               </p:ext>
             </p:extLst>
           </p:nvPr>
         </p:nvGraphicFramePr>
         <p:xfrm>
           <a:off x="114299" y="6634326"/>
-          <a:ext cx="22256275" cy="12442746"/>
+          <a:ext cx="23129159" cy="12442746"/>
         </p:xfrm>
         <a:graphic>
           <a:graphicData uri="http://schemas.openxmlformats.org/drawingml/2006/table">
@@ -3455,7 +4454,7 @@
               </a:tblPr>
               <a:tblGrid>
                 <a:gridCol w="3314701"/>
-                <a:gridCol w="18941574"/>
+                <a:gridCol w="19814458"/>
               </a:tblGrid>
               <a:tr h="3239049">
                 <a:tc>
@@ -3539,21 +4538,8 @@
                             <a:schemeClr val="tx1"/>
                           </a:solidFill>
                         </a:rPr>
-                        <a:t> aware </a:t>
+                        <a:t> aware applications and tools is difficult</a:t>
                       </a:r>
-                      <a:r>
-                        <a:rPr lang="en-CA" sz="4800" b="0" baseline="0" dirty="0" smtClean="0">
-                          <a:solidFill>
-                            <a:schemeClr val="tx1"/>
-                          </a:solidFill>
-                        </a:rPr>
-                        <a:t>applications and tools is difficult</a:t>
-                      </a:r>
-                      <a:endParaRPr lang="en-CA" sz="4800" b="0" baseline="0" dirty="0" smtClean="0">
-                        <a:solidFill>
-                          <a:schemeClr val="tx1"/>
-                        </a:solidFill>
-                      </a:endParaRPr>
                     </a:p>
                     <a:p>
                       <a:pPr marL="1181100" indent="-723900">
@@ -3668,7 +4654,7 @@
                     <a:lstStyle/>
                     <a:p>
                       <a:r>
-                        <a:rPr lang="en-CA" sz="4800" b="1" i="1" dirty="0" smtClean="0">
+                        <a:rPr lang="en-CA" sz="4800" b="1" i="0" dirty="0" smtClean="0">
                           <a:solidFill>
                             <a:schemeClr val="tx1"/>
                           </a:solidFill>
@@ -3918,7 +4904,7 @@
                         <a:defRPr/>
                       </a:pPr>
                       <a:r>
-                        <a:rPr lang="en-CA" sz="4800" b="1" i="1" dirty="0" smtClean="0">
+                        <a:rPr lang="en-CA" sz="4800" b="1" i="0" dirty="0" smtClean="0">
                           <a:solidFill>
                             <a:schemeClr val="tx1"/>
                           </a:solidFill>
@@ -3933,11 +4919,6 @@
                         </a:rPr>
                         <a:t> </a:t>
                       </a:r>
-                      <a:endParaRPr lang="en-CA" sz="4800" b="1" dirty="0" smtClean="0">
-                        <a:solidFill>
-                          <a:schemeClr val="tx1"/>
-                        </a:solidFill>
-                      </a:endParaRPr>
                     </a:p>
                   </a:txBody>
                   <a:tcPr>
@@ -4021,7 +5002,7 @@
                       </a:r>
                     </a:p>
                     <a:p>
-                      <a:pPr marL="1181100" indent="-723900">
+                      <a:pPr marL="1798638" indent="-723900">
                         <a:spcBef>
                           <a:spcPts val="1000"/>
                         </a:spcBef>
@@ -4029,6 +5010,8 @@
                         <a:buChar char="§"/>
                         <a:tabLst>
                           <a:tab pos="914400" algn="l"/>
+                          <a:tab pos="1887538" algn="l"/>
+                          <a:tab pos="2065338" algn="l"/>
                         </a:tabLst>
                       </a:pPr>
                       <a:r>
@@ -4041,7 +5024,7 @@
                       </a:r>
                     </a:p>
                     <a:p>
-                      <a:pPr marL="1181100" indent="-723900">
+                      <a:pPr marL="1798638" indent="-723900">
                         <a:spcBef>
                           <a:spcPts val="1000"/>
                         </a:spcBef>
@@ -4049,6 +5032,8 @@
                         <a:buChar char="§"/>
                         <a:tabLst>
                           <a:tab pos="914400" algn="l"/>
+                          <a:tab pos="1887538" algn="l"/>
+                          <a:tab pos="2065338" algn="l"/>
                         </a:tabLst>
                       </a:pPr>
                       <a:r>
@@ -4139,7 +5124,7 @@
         </p:nvSpPr>
         <p:spPr>
           <a:xfrm>
-            <a:off x="1143944" y="25355174"/>
+            <a:off x="1143944" y="25240874"/>
             <a:ext cx="15477314" cy="1107996"/>
           </a:xfrm>
           <a:prstGeom prst="rect">
@@ -4155,296 +5140,12 @@
           <a:p>
             <a:r>
               <a:rPr lang="en-CA" sz="6600" b="1" dirty="0" smtClean="0"/>
-              <a:t>Spiffy File-System </a:t>
-            </a:r>
-            <a:r>
-              <a:rPr lang="en-CA" sz="6600" b="1" dirty="0" smtClean="0"/>
-              <a:t>Aware Applications</a:t>
+              <a:t>Spiffy File-System Aware Applications</a:t>
             </a:r>
             <a:endParaRPr lang="en-CA" sz="6600" b="1" dirty="0"/>
           </a:p>
         </p:txBody>
       </p:sp>
-      <p:sp>
-        <p:nvSpPr>
-          <p:cNvPr id="196" name="Rectangle 195"/>
-          <p:cNvSpPr/>
-          <p:nvPr/>
-        </p:nvSpPr>
-        <p:spPr>
-          <a:xfrm>
-            <a:off x="20955738" y="35015856"/>
-            <a:ext cx="11318619" cy="8238153"/>
-          </a:xfrm>
-          <a:prstGeom prst="rect">
-            <a:avLst/>
-          </a:prstGeom>
-        </p:spPr>
-        <p:txBody>
-          <a:bodyPr wrap="square">
-            <a:spAutoFit/>
-          </a:bodyPr>
-          <a:lstStyle/>
-          <a:p>
-            <a:r>
-              <a:rPr lang="en-CA" sz="5400" i="1" dirty="0" smtClean="0"/>
-              <a:t>Runtime Metadata </a:t>
-            </a:r>
-            <a:r>
-              <a:rPr lang="en-CA" sz="5400" i="1" dirty="0" smtClean="0"/>
-              <a:t>Interpretation</a:t>
-            </a:r>
-            <a:endParaRPr lang="en-CA" sz="1000" i="1" dirty="0"/>
-          </a:p>
-          <a:p>
-            <a:pPr marL="723900" lvl="1" indent="-685800">
-              <a:spcBef>
-                <a:spcPts val="800"/>
-              </a:spcBef>
-              <a:buFont typeface="Arial" panose="020B0604020202020204" pitchFamily="34" charset="0"/>
-              <a:buChar char="•"/>
-            </a:pPr>
-            <a:r>
-              <a:rPr lang="en-CA" sz="4800" dirty="0"/>
-              <a:t>Intercepts and interprets block type during </a:t>
-            </a:r>
-            <a:r>
-              <a:rPr lang="en-CA" sz="4800" dirty="0" smtClean="0"/>
-              <a:t>runtime</a:t>
-            </a:r>
-            <a:r>
-              <a:rPr lang="en-CA" sz="4800" dirty="0"/>
-              <a:t>, while the file system is </a:t>
-            </a:r>
-            <a:r>
-              <a:rPr lang="en-CA" sz="4800" dirty="0" smtClean="0"/>
-              <a:t>mounted, without any modification to file system</a:t>
-            </a:r>
-            <a:endParaRPr lang="en-CA" sz="4800" dirty="0"/>
-          </a:p>
-          <a:p>
-            <a:pPr marL="38100" lvl="1">
-              <a:spcBef>
-                <a:spcPts val="1000"/>
-              </a:spcBef>
-            </a:pPr>
-            <a:endParaRPr lang="en-CA" sz="400" dirty="0" smtClean="0"/>
-          </a:p>
-          <a:p>
-            <a:pPr>
-              <a:spcBef>
-                <a:spcPts val="1000"/>
-              </a:spcBef>
-            </a:pPr>
-            <a:r>
-              <a:rPr lang="en-CA" sz="5400" i="1" dirty="0"/>
-              <a:t>Prioritized Block Layer Cache</a:t>
-            </a:r>
-            <a:endParaRPr lang="en-CA" sz="1000" i="1" dirty="0"/>
-          </a:p>
-          <a:p>
-            <a:pPr marL="723900" lvl="1" indent="-685800">
-              <a:spcBef>
-                <a:spcPts val="800"/>
-              </a:spcBef>
-              <a:buFont typeface="Arial" panose="020B0604020202020204" pitchFamily="34" charset="0"/>
-              <a:buChar char="•"/>
-            </a:pPr>
-            <a:r>
-              <a:rPr lang="en-CA" sz="4800" dirty="0"/>
-              <a:t>Preferentially caches data </a:t>
-            </a:r>
-            <a:r>
-              <a:rPr lang="en-CA" sz="4800" dirty="0" smtClean="0"/>
-              <a:t>blocks for </a:t>
-            </a:r>
-            <a:r>
-              <a:rPr lang="en-CA" sz="4800" dirty="0"/>
-              <a:t>prioritized users</a:t>
-            </a:r>
-          </a:p>
-          <a:p>
-            <a:pPr marL="723900" lvl="1" indent="-685800">
-              <a:spcBef>
-                <a:spcPts val="800"/>
-              </a:spcBef>
-              <a:buFont typeface="Arial" panose="020B0604020202020204" pitchFamily="34" charset="0"/>
-              <a:buChar char="•"/>
-            </a:pPr>
-            <a:r>
-              <a:rPr lang="en-CA" sz="4800" dirty="0"/>
-              <a:t>Experiment shows </a:t>
-            </a:r>
-            <a:r>
-              <a:rPr lang="en-CA" sz="4800" dirty="0" smtClean="0"/>
-              <a:t>improvement in overall throughput</a:t>
-            </a:r>
-            <a:endParaRPr lang="en-CA" sz="4800" dirty="0"/>
-          </a:p>
-        </p:txBody>
-      </p:sp>
-      <p:sp>
-        <p:nvSpPr>
-          <p:cNvPr id="222" name="Rectangle 221"/>
-          <p:cNvSpPr/>
-          <p:nvPr/>
-        </p:nvSpPr>
-        <p:spPr>
-          <a:xfrm>
-            <a:off x="17650904" y="25242802"/>
-            <a:ext cx="14623453" cy="9782165"/>
-          </a:xfrm>
-          <a:prstGeom prst="rect">
-            <a:avLst/>
-          </a:prstGeom>
-        </p:spPr>
-        <p:txBody>
-          <a:bodyPr wrap="square">
-            <a:spAutoFit/>
-          </a:bodyPr>
-          <a:lstStyle/>
-          <a:p>
-            <a:r>
-              <a:rPr lang="en-CA" sz="5400" i="1" dirty="0" smtClean="0"/>
-              <a:t>File System Conversion Tool</a:t>
-            </a:r>
-            <a:endParaRPr lang="en-CA" sz="1000" dirty="0"/>
-          </a:p>
-          <a:p>
-            <a:pPr marL="685800" indent="-495300">
-              <a:spcBef>
-                <a:spcPts val="800"/>
-              </a:spcBef>
-              <a:buFont typeface="Arial" panose="020B0604020202020204" pitchFamily="34" charset="0"/>
-              <a:buChar char="•"/>
-            </a:pPr>
-            <a:r>
-              <a:rPr lang="en-CA" sz="4800" dirty="0" smtClean="0"/>
-              <a:t>Converts from one file system to another without moving data blocks</a:t>
-            </a:r>
-          </a:p>
-          <a:p>
-            <a:pPr marL="685800" indent="-495300">
-              <a:spcBef>
-                <a:spcPts val="800"/>
-              </a:spcBef>
-              <a:buFont typeface="Arial" panose="020B0604020202020204" pitchFamily="34" charset="0"/>
-              <a:buChar char="•"/>
-            </a:pPr>
-            <a:r>
-              <a:rPr lang="en-CA" sz="4800" dirty="0" smtClean="0"/>
-              <a:t>Experiment shows up to 50 times faster than reformat-and-copy</a:t>
-            </a:r>
-            <a:endParaRPr lang="en-CA" sz="4800" dirty="0"/>
-          </a:p>
-          <a:p>
-            <a:pPr marL="685800" indent="-495300">
-              <a:spcBef>
-                <a:spcPts val="800"/>
-              </a:spcBef>
-              <a:buFont typeface="Arial" panose="020B0604020202020204" pitchFamily="34" charset="0"/>
-              <a:buChar char="•"/>
-            </a:pPr>
-            <a:r>
-              <a:rPr lang="en-CA" sz="4800" dirty="0" smtClean="0"/>
-              <a:t>Comparing Spiffy vs. manually-written </a:t>
-            </a:r>
-            <a:r>
-              <a:rPr lang="en-CA" sz="4800" dirty="0" smtClean="0"/>
-              <a:t>conversion tool shows only 16.7</a:t>
-            </a:r>
-            <a:r>
-              <a:rPr lang="en-CA" sz="4800" dirty="0" smtClean="0"/>
-              <a:t>% </a:t>
-            </a:r>
-            <a:r>
-              <a:rPr lang="en-CA" sz="4800" dirty="0" smtClean="0"/>
-              <a:t>overhead</a:t>
-            </a:r>
-            <a:endParaRPr lang="en-CA" sz="800" dirty="0" smtClean="0"/>
-          </a:p>
-          <a:p>
-            <a:pPr>
-              <a:spcBef>
-                <a:spcPts val="1000"/>
-              </a:spcBef>
-            </a:pPr>
-            <a:r>
-              <a:rPr lang="en-CA" sz="5400" i="1" dirty="0"/>
-              <a:t>Type-Specific Corruption Tool</a:t>
-            </a:r>
-            <a:endParaRPr lang="en-CA" sz="1000" dirty="0"/>
-          </a:p>
-          <a:p>
-            <a:pPr marL="685800" indent="-495300">
-              <a:spcBef>
-                <a:spcPts val="800"/>
-              </a:spcBef>
-              <a:buFont typeface="Arial" panose="020B0604020202020204" pitchFamily="34" charset="0"/>
-              <a:buChar char="•"/>
-            </a:pPr>
-            <a:r>
-              <a:rPr lang="en-CA" sz="4800" dirty="0"/>
-              <a:t>Creates a </a:t>
-            </a:r>
-            <a:r>
-              <a:rPr lang="en-CA" sz="4800" dirty="0" smtClean="0"/>
-              <a:t>corrupt </a:t>
-            </a:r>
-            <a:r>
-              <a:rPr lang="en-CA" sz="4800" dirty="0"/>
-              <a:t>file system image by </a:t>
-            </a:r>
-            <a:r>
-              <a:rPr lang="en-CA" sz="4800" dirty="0" smtClean="0"/>
-              <a:t>wiping </a:t>
-            </a:r>
-            <a:r>
-              <a:rPr lang="en-CA" sz="4800" dirty="0"/>
-              <a:t>a specific field of a metadata structure </a:t>
-            </a:r>
-            <a:endParaRPr lang="en-CA" sz="4800" dirty="0" smtClean="0"/>
-          </a:p>
-          <a:p>
-            <a:pPr marL="685800" indent="-495300">
-              <a:spcBef>
-                <a:spcPts val="800"/>
-              </a:spcBef>
-              <a:buFont typeface="Arial" panose="020B0604020202020204" pitchFamily="34" charset="0"/>
-              <a:buChar char="•"/>
-            </a:pPr>
-            <a:r>
-              <a:rPr lang="en-CA" sz="4800" dirty="0" smtClean="0"/>
-              <a:t>Experiments found crash bugs in dumpe2fs (Ext4) and dump.f2fs (F2FS)</a:t>
-            </a:r>
-            <a:endParaRPr lang="en-CA" sz="4800" dirty="0"/>
-          </a:p>
-        </p:txBody>
-      </p:sp>
-      <p:graphicFrame>
-        <p:nvGraphicFramePr>
-          <p:cNvPr id="269" name="Chart 268"/>
-          <p:cNvGraphicFramePr>
-            <a:graphicFrameLocks/>
-          </p:cNvGraphicFramePr>
-          <p:nvPr>
-            <p:extLst>
-              <p:ext uri="{D42A27DB-BD31-4B8C-83A1-F6EECF244321}">
-                <p14:modId xmlns:p14="http://schemas.microsoft.com/office/powerpoint/2010/main" val="2897028091"/>
-              </p:ext>
-            </p:extLst>
-          </p:nvPr>
-        </p:nvGraphicFramePr>
-        <p:xfrm>
-          <a:off x="-3505111" y="35968416"/>
-          <a:ext cx="24993600" cy="6519970"/>
-        </p:xfrm>
-        <a:graphic>
-          <a:graphicData uri="http://schemas.openxmlformats.org/drawingml/2006/chart">
-            <c:chart xmlns:c="http://schemas.openxmlformats.org/drawingml/2006/chart" xmlns:r="http://schemas.openxmlformats.org/officeDocument/2006/relationships" r:id="rId3"/>
-          </a:graphicData>
-        </a:graphic>
-      </p:graphicFrame>
       <p:sp>
         <p:nvSpPr>
           <p:cNvPr id="270" name="TextBox 269"/>
@@ -4544,15 +5245,7 @@
           <a:p>
             <a:r>
               <a:rPr lang="en-CA" sz="6600" b="1" dirty="0" smtClean="0"/>
-              <a:t>File-System </a:t>
-            </a:r>
-            <a:r>
-              <a:rPr lang="en-CA" sz="6600" b="1" dirty="0" smtClean="0"/>
-              <a:t>Aware </a:t>
-            </a:r>
-            <a:r>
-              <a:rPr lang="en-CA" sz="6600" b="1" dirty="0" smtClean="0"/>
-              <a:t>Applications and Tools</a:t>
+              <a:t>File-System Aware Applications and Tools</a:t>
             </a:r>
           </a:p>
           <a:p>
@@ -12876,7 +13569,7 @@
           <p:nvPr/>
         </p:nvPicPr>
         <p:blipFill>
-          <a:blip r:embed="rId4" cstate="print">
+          <a:blip r:embed="rId3" cstate="print">
             <a:extLst>
               <a:ext uri="{28A0092B-C50C-407E-A947-70E740481C1C}">
                 <a14:useLocalDpi xmlns:a14="http://schemas.microsoft.com/office/drawing/2010/main" val="0"/>
@@ -13280,7 +13973,23 @@
                     <a:schemeClr val="bg1"/>
                   </a:solidFill>
                 </a:rPr>
-                <a:t> allows file system developers to specify missing information needed to correctly parse </a:t>
+                <a:t> </a:t>
+              </a:r>
+              <a:r>
+                <a:rPr lang="en-CA" sz="4800" dirty="0" smtClean="0">
+                  <a:solidFill>
+                    <a:schemeClr val="bg1"/>
+                  </a:solidFill>
+                </a:rPr>
+                <a:t>allow </a:t>
+              </a:r>
+              <a:r>
+                <a:rPr lang="en-CA" sz="4800" dirty="0">
+                  <a:solidFill>
+                    <a:schemeClr val="bg1"/>
+                  </a:solidFill>
+                </a:rPr>
+                <a:t>file system developers to specify missing information needed to correctly parse </a:t>
               </a:r>
               <a:r>
                 <a:rPr lang="en-CA" sz="4800" dirty="0" smtClean="0">
@@ -13544,19 +14253,8 @@
                 <a:latin typeface="Courier New" panose="02070309020205020404" pitchFamily="49" charset="0"/>
                 <a:cs typeface="Courier New" panose="02070309020205020404" pitchFamily="49" charset="0"/>
               </a:rPr>
-              <a:t>size</a:t>
+              <a:t>size;</a:t>
             </a:r>
-            <a:r>
-              <a:rPr lang="en-CA" sz="4400" dirty="0" smtClean="0">
-                <a:latin typeface="Courier New" panose="02070309020205020404" pitchFamily="49" charset="0"/>
-                <a:cs typeface="Courier New" panose="02070309020205020404" pitchFamily="49" charset="0"/>
-              </a:rPr>
-              <a:t>;</a:t>
-            </a:r>
-            <a:endParaRPr lang="en-CA" sz="4400" dirty="0" smtClean="0">
-              <a:latin typeface="Courier New" panose="02070309020205020404" pitchFamily="49" charset="0"/>
-              <a:cs typeface="Courier New" panose="02070309020205020404" pitchFamily="49" charset="0"/>
-            </a:endParaRPr>
           </a:p>
           <a:p>
             <a:pPr marL="0" lvl="1"/>
@@ -13617,14 +14315,7 @@
                 <a:latin typeface="Courier New" panose="02070309020205020404" pitchFamily="49" charset="0"/>
                 <a:cs typeface="Courier New" panose="02070309020205020404" pitchFamily="49" charset="0"/>
               </a:rPr>
-              <a:t> </a:t>
-            </a:r>
-            <a:r>
-              <a:rPr lang="en-CA" sz="4400" dirty="0" smtClean="0">
-                <a:latin typeface="Courier New" panose="02070309020205020404" pitchFamily="49" charset="0"/>
-                <a:cs typeface="Courier New" panose="02070309020205020404" pitchFamily="49" charset="0"/>
-              </a:rPr>
-              <a:t>__</a:t>
+              <a:t> __</a:t>
             </a:r>
             <a:r>
               <a:rPr lang="en-CA" sz="4400" dirty="0">
@@ -13727,14 +14418,14 @@
           <p:nvPr>
             <p:extLst>
               <p:ext uri="{D42A27DB-BD31-4B8C-83A1-F6EECF244321}">
-                <p14:modId xmlns:p14="http://schemas.microsoft.com/office/powerpoint/2010/main" val="3800423368"/>
+                <p14:modId xmlns:p14="http://schemas.microsoft.com/office/powerpoint/2010/main" val="897311836"/>
               </p:ext>
             </p:extLst>
           </p:nvPr>
         </p:nvGraphicFramePr>
         <p:xfrm>
-          <a:off x="280217" y="29173546"/>
-          <a:ext cx="16827912" cy="4937760"/>
+          <a:off x="280217" y="27348240"/>
+          <a:ext cx="31994139" cy="10668000"/>
         </p:xfrm>
         <a:graphic>
           <a:graphicData uri="http://schemas.openxmlformats.org/drawingml/2006/table">
@@ -13743,24 +14434,26 @@
                 <a:tableStyleId>{69012ECD-51FC-41F1-AA8D-1B2483CD663E}</a:tableStyleId>
               </a:tblPr>
               <a:tblGrid>
-                <a:gridCol w="7467602">
+                <a:gridCol w="4596583">
                   <a:extLst>
                     <a:ext uri="{9D8B030D-6E8A-4147-A177-3AD203B41FA5}">
-                      <a16:colId xmlns:a16="http://schemas.microsoft.com/office/drawing/2014/main" xmlns="" val="20000"/>
+                      <a16:colId xmlns="" xmlns:a16="http://schemas.microsoft.com/office/drawing/2014/main" val="20000"/>
                     </a:ext>
                   </a:extLst>
                 </a:gridCol>
-                <a:gridCol w="2819400">
+                <a:gridCol w="10325100"/>
+                <a:gridCol w="8001000"/>
+                <a:gridCol w="2781300">
                   <a:extLst>
                     <a:ext uri="{9D8B030D-6E8A-4147-A177-3AD203B41FA5}">
-                      <a16:colId xmlns:a16="http://schemas.microsoft.com/office/drawing/2014/main" xmlns="" val="20001"/>
+                      <a16:colId xmlns="" xmlns:a16="http://schemas.microsoft.com/office/drawing/2014/main" val="20001"/>
                     </a:ext>
                   </a:extLst>
                 </a:gridCol>
-                <a:gridCol w="6540910">
+                <a:gridCol w="6290156">
                   <a:extLst>
                     <a:ext uri="{9D8B030D-6E8A-4147-A177-3AD203B41FA5}">
-                      <a16:colId xmlns:a16="http://schemas.microsoft.com/office/drawing/2014/main" xmlns="" val="20002"/>
+                      <a16:colId xmlns="" xmlns:a16="http://schemas.microsoft.com/office/drawing/2014/main" val="20002"/>
                     </a:ext>
                   </a:extLst>
                 </a:gridCol>
@@ -13796,9 +14489,127 @@
                       <a:headEnd type="none" w="med" len="med"/>
                       <a:tailEnd type="none" w="med" len="med"/>
                     </a:lnL>
-                    <a:lnR w="57150" cap="flat" cmpd="sng" algn="ctr">
+                    <a:lnR w="12700" cap="flat" cmpd="sng" algn="ctr">
+                      <a:solidFill>
+                        <a:schemeClr val="tx1"/>
+                      </a:solidFill>
+                      <a:prstDash val="solid"/>
+                      <a:round/>
+                      <a:headEnd type="none" w="med" len="med"/>
+                      <a:tailEnd type="none" w="med" len="med"/>
+                    </a:lnR>
+                    <a:lnT w="57150" cap="flat" cmpd="sng" algn="ctr">
                       <a:solidFill>
                         <a:schemeClr val="accent6"/>
+                      </a:solidFill>
+                      <a:prstDash val="solid"/>
+                      <a:round/>
+                      <a:headEnd type="none" w="med" len="med"/>
+                      <a:tailEnd type="none" w="med" len="med"/>
+                    </a:lnT>
+                    <a:lnB w="28575" cap="flat" cmpd="sng" algn="ctr">
+                      <a:solidFill>
+                        <a:schemeClr val="accent6"/>
+                      </a:solidFill>
+                      <a:prstDash val="solid"/>
+                      <a:round/>
+                      <a:headEnd type="none" w="med" len="med"/>
+                      <a:tailEnd type="none" w="med" len="med"/>
+                    </a:lnB>
+                  </a:tcPr>
+                </a:tc>
+                <a:tc>
+                  <a:txBody>
+                    <a:bodyPr/>
+                    <a:lstStyle/>
+                    <a:p>
+                      <a:r>
+                        <a:rPr lang="en-CA" sz="4800" dirty="0" smtClean="0">
+                          <a:solidFill>
+                            <a:schemeClr val="bg1"/>
+                          </a:solidFill>
+                        </a:rPr>
+                        <a:t>Description</a:t>
+                      </a:r>
+                      <a:endParaRPr lang="en-CA" sz="4800" dirty="0">
+                        <a:solidFill>
+                          <a:schemeClr val="bg1"/>
+                        </a:solidFill>
+                      </a:endParaRPr>
+                    </a:p>
+                  </a:txBody>
+                  <a:tcPr>
+                    <a:lnL w="12700" cap="flat" cmpd="sng" algn="ctr">
+                      <a:solidFill>
+                        <a:schemeClr val="tx1"/>
+                      </a:solidFill>
+                      <a:prstDash val="solid"/>
+                      <a:round/>
+                      <a:headEnd type="none" w="med" len="med"/>
+                      <a:tailEnd type="none" w="med" len="med"/>
+                    </a:lnL>
+                    <a:lnR w="12700" cap="flat" cmpd="sng" algn="ctr">
+                      <a:solidFill>
+                        <a:schemeClr val="tx1"/>
+                      </a:solidFill>
+                      <a:prstDash val="solid"/>
+                      <a:round/>
+                      <a:headEnd type="none" w="med" len="med"/>
+                      <a:tailEnd type="none" w="med" len="med"/>
+                    </a:lnR>
+                    <a:lnT w="57150" cap="flat" cmpd="sng" algn="ctr">
+                      <a:solidFill>
+                        <a:schemeClr val="accent6"/>
+                      </a:solidFill>
+                      <a:prstDash val="solid"/>
+                      <a:round/>
+                      <a:headEnd type="none" w="med" len="med"/>
+                      <a:tailEnd type="none" w="med" len="med"/>
+                    </a:lnT>
+                    <a:lnB w="28575" cap="flat" cmpd="sng" algn="ctr">
+                      <a:solidFill>
+                        <a:schemeClr val="accent6"/>
+                      </a:solidFill>
+                      <a:prstDash val="solid"/>
+                      <a:round/>
+                      <a:headEnd type="none" w="med" len="med"/>
+                      <a:tailEnd type="none" w="med" len="med"/>
+                    </a:lnB>
+                  </a:tcPr>
+                </a:tc>
+                <a:tc>
+                  <a:txBody>
+                    <a:bodyPr/>
+                    <a:lstStyle/>
+                    <a:p>
+                      <a:r>
+                        <a:rPr lang="en-CA" sz="4800" dirty="0" smtClean="0">
+                          <a:solidFill>
+                            <a:schemeClr val="bg1"/>
+                          </a:solidFill>
+                        </a:rPr>
+                        <a:t>Experience</a:t>
+                      </a:r>
+                      <a:endParaRPr lang="en-CA" sz="4800" dirty="0">
+                        <a:solidFill>
+                          <a:schemeClr val="bg1"/>
+                        </a:solidFill>
+                      </a:endParaRPr>
+                    </a:p>
+                  </a:txBody>
+                  <a:tcPr>
+                    <a:lnL w="12700" cap="flat" cmpd="sng" algn="ctr">
+                      <a:solidFill>
+                        <a:schemeClr val="tx1"/>
+                      </a:solidFill>
+                      <a:prstDash val="solid"/>
+                      <a:round/>
+                      <a:headEnd type="none" w="med" len="med"/>
+                      <a:tailEnd type="none" w="med" len="med"/>
+                    </a:lnL>
+                    <a:lnR w="12700" cap="flat" cmpd="sng" algn="ctr">
+                      <a:solidFill>
+                        <a:schemeClr val="tx1"/>
                       </a:solidFill>
                       <a:prstDash val="solid"/>
                       <a:round/>
@@ -13846,9 +14657,9 @@
                     </a:p>
                   </a:txBody>
                   <a:tcPr>
-                    <a:lnL w="57150" cap="flat" cmpd="sng" algn="ctr">
+                    <a:lnL w="12700" cap="flat" cmpd="sng" algn="ctr">
                       <a:solidFill>
-                        <a:schemeClr val="accent6"/>
+                        <a:schemeClr val="tx1"/>
                       </a:solidFill>
                       <a:prstDash val="solid"/>
                       <a:round/>
@@ -13961,7 +14772,7 @@
                 </a:tc>
                 <a:extLst>
                   <a:ext uri="{0D108BD9-81ED-4DB2-BD59-A6C34878D82A}">
-                    <a16:rowId xmlns:a16="http://schemas.microsoft.com/office/drawing/2014/main" xmlns="" val="10000"/>
+                    <a16:rowId xmlns="" xmlns:a16="http://schemas.microsoft.com/office/drawing/2014/main" val="10000"/>
                   </a:ext>
                 </a:extLst>
               </a:tr>
@@ -13972,14 +14783,14 @@
                     <a:lstStyle/>
                     <a:p>
                       <a:r>
-                        <a:rPr lang="en-CA" sz="4800" dirty="0" smtClean="0">
+                        <a:rPr lang="en-CA" sz="4400" dirty="0" smtClean="0">
                           <a:solidFill>
                             <a:schemeClr val="tx1"/>
                           </a:solidFill>
                         </a:rPr>
                         <a:t>XML Dump Tool</a:t>
                       </a:r>
-                      <a:endParaRPr lang="en-CA" sz="4800" dirty="0">
+                      <a:endParaRPr lang="en-CA" sz="4400" dirty="0">
                         <a:solidFill>
                           <a:schemeClr val="tx1"/>
                         </a:solidFill>
@@ -13987,6 +14798,15 @@
                     </a:p>
                   </a:txBody>
                   <a:tcPr>
+                    <a:lnR w="12700" cap="flat" cmpd="sng" algn="ctr">
+                      <a:solidFill>
+                        <a:schemeClr val="tx1"/>
+                      </a:solidFill>
+                      <a:prstDash val="solid"/>
+                      <a:round/>
+                      <a:headEnd type="none" w="med" len="med"/>
+                      <a:tailEnd type="none" w="med" len="med"/>
+                    </a:lnR>
                     <a:lnT w="28575" cap="flat" cmpd="sng" algn="ctr">
                       <a:solidFill>
                         <a:schemeClr val="accent6"/>
@@ -14004,14 +14824,22 @@
                     <a:lstStyle/>
                     <a:p>
                       <a:r>
-                        <a:rPr lang="en-CA" sz="4800" dirty="0" smtClean="0">
-                          <a:solidFill>
-                            <a:schemeClr val="tx1"/>
-                          </a:solidFill>
-                        </a:rPr>
-                        <a:t>565</a:t>
+                        <a:rPr lang="en-CA" sz="4400" dirty="0" smtClean="0"/>
+                        <a:t>Traverses file</a:t>
                       </a:r>
-                      <a:endParaRPr lang="en-CA" sz="4800" dirty="0">
+                      <a:r>
+                        <a:rPr lang="en-CA" sz="4400" baseline="0" dirty="0" smtClean="0"/>
+                        <a:t> system</a:t>
+                      </a:r>
+                      <a:r>
+                        <a:rPr lang="en-CA" sz="4400" dirty="0" smtClean="0"/>
+                        <a:t> and prints all metadata </a:t>
+                      </a:r>
+                      <a:r>
+                        <a:rPr lang="en-CA" sz="4400" baseline="0" dirty="0" smtClean="0"/>
+                        <a:t>structures and fields</a:t>
+                      </a:r>
+                      <a:endParaRPr lang="en-CA" sz="4400" dirty="0">
                         <a:solidFill>
                           <a:schemeClr val="tx1"/>
                         </a:solidFill>
@@ -14019,6 +14847,24 @@
                     </a:p>
                   </a:txBody>
                   <a:tcPr>
+                    <a:lnL w="12700" cap="flat" cmpd="sng" algn="ctr">
+                      <a:solidFill>
+                        <a:schemeClr val="tx1"/>
+                      </a:solidFill>
+                      <a:prstDash val="solid"/>
+                      <a:round/>
+                      <a:headEnd type="none" w="med" len="med"/>
+                      <a:tailEnd type="none" w="med" len="med"/>
+                    </a:lnL>
+                    <a:lnR w="12700" cap="flat" cmpd="sng" algn="ctr">
+                      <a:solidFill>
+                        <a:schemeClr val="tx1"/>
+                      </a:solidFill>
+                      <a:prstDash val="solid"/>
+                      <a:round/>
+                      <a:headEnd type="none" w="med" len="med"/>
+                      <a:tailEnd type="none" w="med" len="med"/>
+                    </a:lnR>
                     <a:lnT w="28575" cap="flat" cmpd="sng" algn="ctr">
                       <a:solidFill>
                         <a:schemeClr val="accent6"/>
@@ -14036,14 +14882,10 @@
                     <a:lstStyle/>
                     <a:p>
                       <a:r>
-                        <a:rPr lang="en-CA" sz="4800" dirty="0" smtClean="0">
-                          <a:solidFill>
-                            <a:schemeClr val="tx1"/>
-                          </a:solidFill>
-                        </a:rPr>
-                        <a:t>40~50</a:t>
+                        <a:rPr lang="en-CA" sz="4400" dirty="0" smtClean="0"/>
+                        <a:t>Very valuable debugging aid during development</a:t>
                       </a:r>
-                      <a:endParaRPr lang="en-CA" sz="4800" dirty="0">
+                      <a:endParaRPr lang="en-CA" sz="4400" dirty="0">
                         <a:solidFill>
                           <a:schemeClr val="tx1"/>
                         </a:solidFill>
@@ -14051,6 +14893,115 @@
                     </a:p>
                   </a:txBody>
                   <a:tcPr>
+                    <a:lnL w="12700" cap="flat" cmpd="sng" algn="ctr">
+                      <a:solidFill>
+                        <a:schemeClr val="tx1"/>
+                      </a:solidFill>
+                      <a:prstDash val="solid"/>
+                      <a:round/>
+                      <a:headEnd type="none" w="med" len="med"/>
+                      <a:tailEnd type="none" w="med" len="med"/>
+                    </a:lnL>
+                    <a:lnR w="12700" cap="flat" cmpd="sng" algn="ctr">
+                      <a:solidFill>
+                        <a:schemeClr val="tx1"/>
+                      </a:solidFill>
+                      <a:prstDash val="solid"/>
+                      <a:round/>
+                      <a:headEnd type="none" w="med" len="med"/>
+                      <a:tailEnd type="none" w="med" len="med"/>
+                    </a:lnR>
+                    <a:lnT w="28575" cap="flat" cmpd="sng" algn="ctr">
+                      <a:solidFill>
+                        <a:schemeClr val="accent6"/>
+                      </a:solidFill>
+                      <a:prstDash val="solid"/>
+                      <a:round/>
+                      <a:headEnd type="none" w="med" len="med"/>
+                      <a:tailEnd type="none" w="med" len="med"/>
+                    </a:lnT>
+                  </a:tcPr>
+                </a:tc>
+                <a:tc>
+                  <a:txBody>
+                    <a:bodyPr/>
+                    <a:lstStyle/>
+                    <a:p>
+                      <a:pPr algn="ctr"/>
+                      <a:r>
+                        <a:rPr lang="en-CA" sz="4400" dirty="0" smtClean="0">
+                          <a:solidFill>
+                            <a:schemeClr val="tx1"/>
+                          </a:solidFill>
+                        </a:rPr>
+                        <a:t>565</a:t>
+                      </a:r>
+                      <a:endParaRPr lang="en-CA" sz="4400" dirty="0">
+                        <a:solidFill>
+                          <a:schemeClr val="tx1"/>
+                        </a:solidFill>
+                      </a:endParaRPr>
+                    </a:p>
+                  </a:txBody>
+                  <a:tcPr anchor="ctr">
+                    <a:lnL w="12700" cap="flat" cmpd="sng" algn="ctr">
+                      <a:solidFill>
+                        <a:schemeClr val="tx1"/>
+                      </a:solidFill>
+                      <a:prstDash val="solid"/>
+                      <a:round/>
+                      <a:headEnd type="none" w="med" len="med"/>
+                      <a:tailEnd type="none" w="med" len="med"/>
+                    </a:lnL>
+                    <a:lnT w="28575" cap="flat" cmpd="sng" algn="ctr">
+                      <a:solidFill>
+                        <a:schemeClr val="accent6"/>
+                      </a:solidFill>
+                      <a:prstDash val="solid"/>
+                      <a:round/>
+                      <a:headEnd type="none" w="med" len="med"/>
+                      <a:tailEnd type="none" w="med" len="med"/>
+                    </a:lnT>
+                  </a:tcPr>
+                </a:tc>
+                <a:tc>
+                  <a:txBody>
+                    <a:bodyPr/>
+                    <a:lstStyle/>
+                    <a:p>
+                      <a:pPr algn="ctr"/>
+                      <a:r>
+                        <a:rPr lang="en-CA" sz="4400" dirty="0" smtClean="0">
+                          <a:solidFill>
+                            <a:schemeClr val="tx1"/>
+                          </a:solidFill>
+                        </a:rPr>
+                        <a:t>40 –</a:t>
+                      </a:r>
+                      <a:r>
+                        <a:rPr lang="en-CA" sz="4400" baseline="0" dirty="0" smtClean="0">
+                          <a:solidFill>
+                            <a:schemeClr val="tx1"/>
+                          </a:solidFill>
+                        </a:rPr>
+                        <a:t> </a:t>
+                      </a:r>
+                      <a:r>
+                        <a:rPr lang="en-CA" sz="4400" dirty="0" smtClean="0">
+                          <a:solidFill>
+                            <a:schemeClr val="tx1"/>
+                          </a:solidFill>
+                        </a:rPr>
+                        <a:t>50 (All)</a:t>
+                      </a:r>
+                      <a:endParaRPr lang="en-CA" sz="4400" dirty="0">
+                        <a:solidFill>
+                          <a:schemeClr val="tx1"/>
+                        </a:solidFill>
+                      </a:endParaRPr>
+                    </a:p>
+                  </a:txBody>
+                  <a:tcPr anchor="ctr">
                     <a:lnT w="28575" cap="flat" cmpd="sng" algn="ctr">
                       <a:solidFill>
                         <a:schemeClr val="accent6"/>
@@ -14064,7 +15015,7 @@
                 </a:tc>
                 <a:extLst>
                   <a:ext uri="{0D108BD9-81ED-4DB2-BD59-A6C34878D82A}">
-                    <a16:rowId xmlns:a16="http://schemas.microsoft.com/office/drawing/2014/main" xmlns="" val="10001"/>
+                    <a16:rowId xmlns="" xmlns:a16="http://schemas.microsoft.com/office/drawing/2014/main" val="10001"/>
                   </a:ext>
                 </a:extLst>
               </a:tr>
@@ -14075,7 +15026,7 @@
                     <a:lstStyle/>
                     <a:p>
                       <a:r>
-                        <a:rPr lang="en-CA" sz="4800" dirty="0" smtClean="0">
+                        <a:rPr lang="en-CA" sz="4400" dirty="0" smtClean="0">
                           <a:solidFill>
                             <a:schemeClr val="tx1"/>
                           </a:solidFill>
@@ -14083,21 +15034,47 @@
                         <a:t>Free Space</a:t>
                       </a:r>
                       <a:r>
-                        <a:rPr lang="en-CA" sz="4800" baseline="0" dirty="0" smtClean="0">
+                        <a:rPr lang="en-CA" sz="4400" baseline="0" dirty="0" smtClean="0">
                           <a:solidFill>
                             <a:schemeClr val="tx1"/>
                           </a:solidFill>
                         </a:rPr>
-                        <a:t> Display Tool</a:t>
+                        <a:t> </a:t>
                       </a:r>
-                      <a:endParaRPr lang="en-CA" sz="4800" dirty="0">
+                      <a:r>
+                        <a:rPr lang="en-CA" sz="4400" baseline="0" dirty="0" smtClean="0">
+                          <a:solidFill>
+                            <a:schemeClr val="tx1"/>
+                          </a:solidFill>
+                        </a:rPr>
+                        <a:t>Histogram </a:t>
+                      </a:r>
+                      <a:r>
+                        <a:rPr lang="en-CA" sz="4400" baseline="0" dirty="0" smtClean="0">
+                          <a:solidFill>
+                            <a:schemeClr val="tx1"/>
+                          </a:solidFill>
+                        </a:rPr>
+                        <a:t>Tool</a:t>
+                      </a:r>
+                      <a:endParaRPr lang="en-CA" sz="4400" dirty="0">
                         <a:solidFill>
                           <a:schemeClr val="tx1"/>
                         </a:solidFill>
                       </a:endParaRPr>
                     </a:p>
                   </a:txBody>
-                  <a:tcPr/>
+                  <a:tcPr>
+                    <a:lnR w="12700" cap="flat" cmpd="sng" algn="ctr">
+                      <a:solidFill>
+                        <a:schemeClr val="tx1"/>
+                      </a:solidFill>
+                      <a:prstDash val="solid"/>
+                      <a:round/>
+                      <a:headEnd type="none" w="med" len="med"/>
+                      <a:tailEnd type="none" w="med" len="med"/>
+                    </a:lnR>
+                  </a:tcPr>
                 </a:tc>
                 <a:tc>
                   <a:txBody>
@@ -14105,21 +15082,60 @@
                     <a:lstStyle/>
                     <a:p>
                       <a:r>
-                        <a:rPr lang="en-CA" sz="4800" dirty="0" smtClean="0">
-                          <a:solidFill>
-                            <a:schemeClr val="tx1"/>
-                          </a:solidFill>
-                        </a:rPr>
-                        <a:t>271</a:t>
+                        <a:rPr lang="en-CA" sz="4400" dirty="0" smtClean="0"/>
+                        <a:t>Finds</a:t>
                       </a:r>
-                      <a:endParaRPr lang="en-CA" sz="4800" dirty="0">
+                      <a:r>
+                        <a:rPr lang="en-CA" sz="4400" baseline="0" dirty="0" smtClean="0"/>
+                        <a:t> and </a:t>
+                      </a:r>
+                      <a:r>
+                        <a:rPr lang="en-CA" sz="4400" dirty="0" smtClean="0"/>
+                        <a:t>processes</a:t>
+                      </a:r>
+                      <a:r>
+                        <a:rPr lang="en-CA" sz="4400" baseline="0" dirty="0" smtClean="0"/>
+                        <a:t> </a:t>
+                      </a:r>
+                      <a:r>
+                        <a:rPr lang="en-CA" sz="4400" dirty="0" smtClean="0"/>
+                        <a:t>block allocation metadata</a:t>
+                      </a:r>
+                      <a:r>
+                        <a:rPr lang="en-CA" sz="4400" baseline="0" dirty="0" smtClean="0"/>
+                        <a:t> and </a:t>
+                      </a:r>
+                      <a:r>
+                        <a:rPr lang="en-CA" sz="4400" dirty="0" smtClean="0"/>
+                        <a:t> prints histogram of free extent sizes</a:t>
+                      </a:r>
+                      <a:endParaRPr lang="en-CA" sz="4400" dirty="0">
                         <a:solidFill>
                           <a:schemeClr val="tx1"/>
                         </a:solidFill>
                       </a:endParaRPr>
                     </a:p>
                   </a:txBody>
-                  <a:tcPr/>
+                  <a:tcPr>
+                    <a:lnL w="12700" cap="flat" cmpd="sng" algn="ctr">
+                      <a:solidFill>
+                        <a:schemeClr val="tx1"/>
+                      </a:solidFill>
+                      <a:prstDash val="solid"/>
+                      <a:round/>
+                      <a:headEnd type="none" w="med" len="med"/>
+                      <a:tailEnd type="none" w="med" len="med"/>
+                    </a:lnL>
+                    <a:lnR w="12700" cap="flat" cmpd="sng" algn="ctr">
+                      <a:solidFill>
+                        <a:schemeClr val="tx1"/>
+                      </a:solidFill>
+                      <a:prstDash val="solid"/>
+                      <a:round/>
+                      <a:headEnd type="none" w="med" len="med"/>
+                      <a:tailEnd type="none" w="med" len="med"/>
+                    </a:lnR>
+                  </a:tcPr>
                 </a:tc>
                 <a:tc>
                   <a:txBody>
@@ -14127,25 +15143,131 @@
                     <a:lstStyle/>
                     <a:p>
                       <a:r>
-                        <a:rPr lang="en-CA" sz="4800" dirty="0" smtClean="0">
-                          <a:solidFill>
-                            <a:schemeClr val="tx1"/>
-                          </a:solidFill>
-                        </a:rPr>
-                        <a:t>76~194 (F2FS)</a:t>
+                        <a:rPr lang="en-CA" sz="4400" dirty="0" smtClean="0"/>
+                        <a:t>Shows degree of fragmentation in file system</a:t>
                       </a:r>
-                      <a:endParaRPr lang="en-CA" sz="4800" dirty="0">
+                      <a:endParaRPr lang="en-CA" sz="4400" dirty="0">
                         <a:solidFill>
                           <a:schemeClr val="tx1"/>
                         </a:solidFill>
                       </a:endParaRPr>
                     </a:p>
                   </a:txBody>
-                  <a:tcPr/>
+                  <a:tcPr>
+                    <a:lnL w="12700" cap="flat" cmpd="sng" algn="ctr">
+                      <a:solidFill>
+                        <a:schemeClr val="tx1"/>
+                      </a:solidFill>
+                      <a:prstDash val="solid"/>
+                      <a:round/>
+                      <a:headEnd type="none" w="med" len="med"/>
+                      <a:tailEnd type="none" w="med" len="med"/>
+                    </a:lnL>
+                    <a:lnR w="12700" cap="flat" cmpd="sng" algn="ctr">
+                      <a:solidFill>
+                        <a:schemeClr val="tx1"/>
+                      </a:solidFill>
+                      <a:prstDash val="solid"/>
+                      <a:round/>
+                      <a:headEnd type="none" w="med" len="med"/>
+                      <a:tailEnd type="none" w="med" len="med"/>
+                    </a:lnR>
+                  </a:tcPr>
+                </a:tc>
+                <a:tc>
+                  <a:txBody>
+                    <a:bodyPr/>
+                    <a:lstStyle/>
+                    <a:p>
+                      <a:pPr algn="ctr"/>
+                      <a:r>
+                        <a:rPr lang="en-CA" sz="4400" dirty="0" smtClean="0">
+                          <a:solidFill>
+                            <a:schemeClr val="tx1"/>
+                          </a:solidFill>
+                        </a:rPr>
+                        <a:t>271</a:t>
+                      </a:r>
+                      <a:endParaRPr lang="en-CA" sz="4400" dirty="0">
+                        <a:solidFill>
+                          <a:schemeClr val="tx1"/>
+                        </a:solidFill>
+                      </a:endParaRPr>
+                    </a:p>
+                  </a:txBody>
+                  <a:tcPr anchor="ctr">
+                    <a:lnL w="12700" cap="flat" cmpd="sng" algn="ctr">
+                      <a:solidFill>
+                        <a:schemeClr val="tx1"/>
+                      </a:solidFill>
+                      <a:prstDash val="solid"/>
+                      <a:round/>
+                      <a:headEnd type="none" w="med" len="med"/>
+                      <a:tailEnd type="none" w="med" len="med"/>
+                    </a:lnL>
+                  </a:tcPr>
+                </a:tc>
+                <a:tc>
+                  <a:txBody>
+                    <a:bodyPr/>
+                    <a:lstStyle/>
+                    <a:p>
+                      <a:pPr algn="ctr"/>
+                      <a:r>
+                        <a:rPr lang="en-CA" sz="4400" dirty="0" smtClean="0">
+                          <a:solidFill>
+                            <a:schemeClr val="tx1"/>
+                          </a:solidFill>
+                        </a:rPr>
+                        <a:t>~76 (Ext4, </a:t>
+                      </a:r>
+                      <a:r>
+                        <a:rPr lang="en-CA" sz="4400" dirty="0" err="1" smtClean="0">
+                          <a:solidFill>
+                            <a:schemeClr val="tx1"/>
+                          </a:solidFill>
+                        </a:rPr>
+                        <a:t>Btrfs</a:t>
+                      </a:r>
+                      <a:r>
+                        <a:rPr lang="en-CA" sz="4400" dirty="0" smtClean="0">
+                          <a:solidFill>
+                            <a:schemeClr val="tx1"/>
+                          </a:solidFill>
+                        </a:rPr>
+                        <a:t>)</a:t>
+                      </a:r>
+                    </a:p>
+                    <a:p>
+                      <a:pPr algn="ctr"/>
+                      <a:r>
+                        <a:rPr lang="en-CA" sz="4400" dirty="0" smtClean="0">
+                          <a:solidFill>
+                            <a:schemeClr val="tx1"/>
+                          </a:solidFill>
+                        </a:rPr>
+                        <a:t>194 </a:t>
+                      </a:r>
+                      <a:r>
+                        <a:rPr lang="en-CA" sz="4400" dirty="0" smtClean="0">
+                          <a:solidFill>
+                            <a:schemeClr val="tx1"/>
+                          </a:solidFill>
+                        </a:rPr>
+                        <a:t>(F2FS)</a:t>
+                      </a:r>
+                      <a:endParaRPr lang="en-CA" sz="4400" dirty="0">
+                        <a:solidFill>
+                          <a:schemeClr val="tx1"/>
+                        </a:solidFill>
+                      </a:endParaRPr>
+                    </a:p>
+                  </a:txBody>
+                  <a:tcPr anchor="ctr"/>
                 </a:tc>
                 <a:extLst>
                   <a:ext uri="{0D108BD9-81ED-4DB2-BD59-A6C34878D82A}">
-                    <a16:rowId xmlns:a16="http://schemas.microsoft.com/office/drawing/2014/main" xmlns="" val="10002"/>
+                    <a16:rowId xmlns="" xmlns:a16="http://schemas.microsoft.com/office/drawing/2014/main" val="10002"/>
                   </a:ext>
                 </a:extLst>
               </a:tr>
@@ -14156,7 +15278,7 @@
                     <a:lstStyle/>
                     <a:p>
                       <a:r>
-                        <a:rPr lang="en-CA" sz="4800" dirty="0" smtClean="0">
+                        <a:rPr lang="en-CA" sz="4400" dirty="0" smtClean="0">
                           <a:solidFill>
                             <a:schemeClr val="tx1"/>
                           </a:solidFill>
@@ -14164,69 +15286,197 @@
                         <a:t>Type-Specific</a:t>
                       </a:r>
                       <a:r>
-                        <a:rPr lang="en-CA" sz="4800" baseline="0" dirty="0" smtClean="0">
+                        <a:rPr lang="en-CA" sz="4400" baseline="0" dirty="0" smtClean="0">
                           <a:solidFill>
                             <a:schemeClr val="tx1"/>
                           </a:solidFill>
                         </a:rPr>
                         <a:t> Corruptor</a:t>
                       </a:r>
-                      <a:endParaRPr lang="en-CA" sz="4800" dirty="0">
+                      <a:endParaRPr lang="en-CA" sz="4400" dirty="0">
                         <a:solidFill>
                           <a:schemeClr val="tx1"/>
                         </a:solidFill>
                       </a:endParaRPr>
                     </a:p>
                   </a:txBody>
-                  <a:tcPr/>
+                  <a:tcPr>
+                    <a:lnR w="12700" cap="flat" cmpd="sng" algn="ctr">
+                      <a:solidFill>
+                        <a:schemeClr val="tx1"/>
+                      </a:solidFill>
+                      <a:prstDash val="solid"/>
+                      <a:round/>
+                      <a:headEnd type="none" w="med" len="med"/>
+                      <a:tailEnd type="none" w="med" len="med"/>
+                    </a:lnR>
+                  </a:tcPr>
                 </a:tc>
                 <a:tc>
                   <a:txBody>
                     <a:bodyPr/>
                     <a:lstStyle/>
                     <a:p>
+                      <a:pPr marL="0" marR="0" lvl="0" indent="0" algn="l" defTabSz="1645920" rtl="0" eaLnBrk="1" fontAlgn="auto" latinLnBrk="0" hangingPunct="1">
+                        <a:lnSpc>
+                          <a:spcPct val="100000"/>
+                        </a:lnSpc>
+                        <a:spcBef>
+                          <a:spcPts val="0"/>
+                        </a:spcBef>
+                        <a:spcAft>
+                          <a:spcPts val="0"/>
+                        </a:spcAft>
+                        <a:buClrTx/>
+                        <a:buSzTx/>
+                        <a:buFontTx/>
+                        <a:buNone/>
+                        <a:tabLst/>
+                        <a:defRPr/>
+                      </a:pPr>
                       <a:r>
-                        <a:rPr lang="en-CA" sz="4800" dirty="0" smtClean="0">
+                        <a:rPr lang="en-CA" sz="4400" dirty="0" smtClean="0"/>
+                        <a:t>Creates a corrupt file system image by clobbering a specific field of a metadata structure </a:t>
+                      </a:r>
+                    </a:p>
+                  </a:txBody>
+                  <a:tcPr>
+                    <a:lnL w="12700" cap="flat" cmpd="sng" algn="ctr">
+                      <a:solidFill>
+                        <a:schemeClr val="tx1"/>
+                      </a:solidFill>
+                      <a:prstDash val="solid"/>
+                      <a:round/>
+                      <a:headEnd type="none" w="med" len="med"/>
+                      <a:tailEnd type="none" w="med" len="med"/>
+                    </a:lnL>
+                    <a:lnR w="12700" cap="flat" cmpd="sng" algn="ctr">
+                      <a:solidFill>
+                        <a:schemeClr val="tx1"/>
+                      </a:solidFill>
+                      <a:prstDash val="solid"/>
+                      <a:round/>
+                      <a:headEnd type="none" w="med" len="med"/>
+                      <a:tailEnd type="none" w="med" len="med"/>
+                    </a:lnR>
+                  </a:tcPr>
+                </a:tc>
+                <a:tc>
+                  <a:txBody>
+                    <a:bodyPr/>
+                    <a:lstStyle/>
+                    <a:p>
+                      <a:pPr marL="0" marR="0" lvl="0" indent="0" algn="l" defTabSz="1645920" rtl="0" eaLnBrk="1" fontAlgn="auto" latinLnBrk="0" hangingPunct="1">
+                        <a:lnSpc>
+                          <a:spcPct val="100000"/>
+                        </a:lnSpc>
+                        <a:spcBef>
+                          <a:spcPts val="0"/>
+                        </a:spcBef>
+                        <a:spcAft>
+                          <a:spcPts val="0"/>
+                        </a:spcAft>
+                        <a:buClrTx/>
+                        <a:buSzTx/>
+                        <a:buFontTx/>
+                        <a:buNone/>
+                        <a:tabLst/>
+                        <a:defRPr/>
+                      </a:pPr>
+                      <a:r>
+                        <a:rPr lang="en-CA" sz="4400" dirty="0" smtClean="0"/>
+                        <a:t>Experiments found crash bugs in dumpe2fs (Ext4) and dump.f2fs (F2FS)</a:t>
+                      </a:r>
+                    </a:p>
+                  </a:txBody>
+                  <a:tcPr>
+                    <a:lnL w="12700" cap="flat" cmpd="sng" algn="ctr">
+                      <a:solidFill>
+                        <a:schemeClr val="tx1"/>
+                      </a:solidFill>
+                      <a:prstDash val="solid"/>
+                      <a:round/>
+                      <a:headEnd type="none" w="med" len="med"/>
+                      <a:tailEnd type="none" w="med" len="med"/>
+                    </a:lnL>
+                    <a:lnR w="12700" cap="flat" cmpd="sng" algn="ctr">
+                      <a:solidFill>
+                        <a:schemeClr val="tx1"/>
+                      </a:solidFill>
+                      <a:prstDash val="solid"/>
+                      <a:round/>
+                      <a:headEnd type="none" w="med" len="med"/>
+                      <a:tailEnd type="none" w="med" len="med"/>
+                    </a:lnR>
+                  </a:tcPr>
+                </a:tc>
+                <a:tc>
+                  <a:txBody>
+                    <a:bodyPr/>
+                    <a:lstStyle/>
+                    <a:p>
+                      <a:pPr algn="ctr"/>
+                      <a:r>
+                        <a:rPr lang="en-CA" sz="4400" dirty="0" smtClean="0">
                           <a:solidFill>
                             <a:schemeClr val="tx1"/>
                           </a:solidFill>
                         </a:rPr>
                         <a:t>455</a:t>
                       </a:r>
-                      <a:endParaRPr lang="en-CA" sz="4800" dirty="0">
+                      <a:endParaRPr lang="en-CA" sz="4400" dirty="0">
                         <a:solidFill>
                           <a:schemeClr val="tx1"/>
                         </a:solidFill>
                       </a:endParaRPr>
                     </a:p>
                   </a:txBody>
-                  <a:tcPr/>
+                  <a:tcPr anchor="ctr">
+                    <a:lnL w="12700" cap="flat" cmpd="sng" algn="ctr">
+                      <a:solidFill>
+                        <a:schemeClr val="tx1"/>
+                      </a:solidFill>
+                      <a:prstDash val="solid"/>
+                      <a:round/>
+                      <a:headEnd type="none" w="med" len="med"/>
+                      <a:tailEnd type="none" w="med" len="med"/>
+                    </a:lnL>
+                  </a:tcPr>
                 </a:tc>
                 <a:tc>
                   <a:txBody>
                     <a:bodyPr/>
                     <a:lstStyle/>
                     <a:p>
+                      <a:pPr algn="ctr"/>
                       <a:r>
-                        <a:rPr lang="en-CA" sz="4800" dirty="0" smtClean="0">
+                        <a:rPr lang="en-CA" sz="4400" dirty="0" smtClean="0">
                           <a:solidFill>
                             <a:schemeClr val="tx1"/>
                           </a:solidFill>
                         </a:rPr>
-                        <a:t>&lt; 30</a:t>
+                        <a:t>&lt; </a:t>
                       </a:r>
-                      <a:endParaRPr lang="en-CA" sz="4800" dirty="0">
+                      <a:r>
+                        <a:rPr lang="en-CA" sz="4400" dirty="0" smtClean="0">
+                          <a:solidFill>
+                            <a:schemeClr val="tx1"/>
+                          </a:solidFill>
+                        </a:rPr>
+                        <a:t>30 (All)</a:t>
+                      </a:r>
+                      <a:endParaRPr lang="en-CA" sz="4400" dirty="0">
                         <a:solidFill>
                           <a:schemeClr val="tx1"/>
                         </a:solidFill>
                       </a:endParaRPr>
                     </a:p>
                   </a:txBody>
-                  <a:tcPr/>
+                  <a:tcPr anchor="ctr"/>
                 </a:tc>
                 <a:extLst>
                   <a:ext uri="{0D108BD9-81ED-4DB2-BD59-A6C34878D82A}">
-                    <a16:rowId xmlns:a16="http://schemas.microsoft.com/office/drawing/2014/main" xmlns="" val="10003"/>
+                    <a16:rowId xmlns="" xmlns:a16="http://schemas.microsoft.com/office/drawing/2014/main" val="10003"/>
                   </a:ext>
                 </a:extLst>
               </a:tr>
@@ -14237,15 +15487,60 @@
                     <a:lstStyle/>
                     <a:p>
                       <a:r>
-                        <a:rPr lang="en-CA" sz="4800" dirty="0" smtClean="0">
+                        <a:rPr lang="en-CA" sz="4400" dirty="0" smtClean="0">
                           <a:solidFill>
                             <a:schemeClr val="tx1"/>
                           </a:solidFill>
                         </a:rPr>
-                        <a:t>Ext4 to F2FS</a:t>
+                        <a:t>In-Place File System Converter</a:t>
+                      </a:r>
+                      <a:endParaRPr lang="en-CA" sz="4400" dirty="0">
+                        <a:solidFill>
+                          <a:schemeClr val="tx1"/>
+                        </a:solidFill>
+                      </a:endParaRPr>
+                    </a:p>
+                  </a:txBody>
+                  <a:tcPr>
+                    <a:lnR w="12700" cap="flat" cmpd="sng" algn="ctr">
+                      <a:solidFill>
+                        <a:schemeClr val="tx1"/>
+                      </a:solidFill>
+                      <a:prstDash val="solid"/>
+                      <a:round/>
+                      <a:headEnd type="none" w="med" len="med"/>
+                      <a:tailEnd type="none" w="med" len="med"/>
+                    </a:lnR>
+                  </a:tcPr>
+                </a:tc>
+                <a:tc>
+                  <a:txBody>
+                    <a:bodyPr/>
+                    <a:lstStyle/>
+                    <a:p>
+                      <a:pPr marL="0" marR="0" lvl="0" indent="0" algn="l" defTabSz="1645920" rtl="0" eaLnBrk="1" fontAlgn="auto" latinLnBrk="0" hangingPunct="1">
+                        <a:lnSpc>
+                          <a:spcPct val="100000"/>
+                        </a:lnSpc>
+                        <a:spcBef>
+                          <a:spcPts val="0"/>
+                        </a:spcBef>
+                        <a:spcAft>
+                          <a:spcPts val="0"/>
+                        </a:spcAft>
+                        <a:buClrTx/>
+                        <a:buSzTx/>
+                        <a:buFontTx/>
+                        <a:buNone/>
+                        <a:tabLst/>
+                        <a:defRPr/>
+                      </a:pPr>
+                      <a:r>
+                        <a:rPr lang="en-CA" sz="4400" dirty="0" smtClean="0"/>
+                        <a:t>Converts from one file system to another without moving data blocks</a:t>
                       </a:r>
                       <a:r>
-                        <a:rPr lang="en-CA" sz="4800" baseline="0" dirty="0" smtClean="0">
+                        <a:rPr lang="en-CA" sz="4400" baseline="0" dirty="0">
                           <a:solidFill>
                             <a:schemeClr val="tx1"/>
                           </a:solidFill>
@@ -14253,77 +15548,183 @@
                         <a:t> </a:t>
                       </a:r>
                       <a:r>
-                        <a:rPr lang="en-CA" sz="4800" dirty="0" smtClean="0">
+                        <a:rPr lang="en-CA" sz="4400" baseline="0" dirty="0" smtClean="0">
                           <a:solidFill>
                             <a:schemeClr val="tx1"/>
                           </a:solidFill>
                         </a:rPr>
-                        <a:t>Converter</a:t>
+                        <a:t>unless necessary</a:t>
                       </a:r>
-                      <a:endParaRPr lang="en-CA" sz="4800" dirty="0">
+                      <a:endParaRPr lang="en-CA" sz="4400" dirty="0" smtClean="0"/>
+                    </a:p>
+                  </a:txBody>
+                  <a:tcPr>
+                    <a:lnL w="12700" cap="flat" cmpd="sng" algn="ctr">
+                      <a:solidFill>
+                        <a:schemeClr val="tx1"/>
+                      </a:solidFill>
+                      <a:prstDash val="solid"/>
+                      <a:round/>
+                      <a:headEnd type="none" w="med" len="med"/>
+                      <a:tailEnd type="none" w="med" len="med"/>
+                    </a:lnL>
+                    <a:lnR w="12700" cap="flat" cmpd="sng" algn="ctr">
+                      <a:solidFill>
+                        <a:schemeClr val="tx1"/>
+                      </a:solidFill>
+                      <a:prstDash val="solid"/>
+                      <a:round/>
+                      <a:headEnd type="none" w="med" len="med"/>
+                      <a:tailEnd type="none" w="med" len="med"/>
+                    </a:lnR>
+                  </a:tcPr>
+                </a:tc>
+                <a:tc>
+                  <a:txBody>
+                    <a:bodyPr/>
+                    <a:lstStyle/>
+                    <a:p>
+                      <a:pPr marL="0" marR="0" lvl="0" indent="0" algn="l" defTabSz="1645920" rtl="0" eaLnBrk="1" fontAlgn="auto" latinLnBrk="0" hangingPunct="1">
+                        <a:lnSpc>
+                          <a:spcPct val="100000"/>
+                        </a:lnSpc>
+                        <a:spcBef>
+                          <a:spcPts val="0"/>
+                        </a:spcBef>
+                        <a:spcAft>
+                          <a:spcPts val="0"/>
+                        </a:spcAft>
+                        <a:buClrTx/>
+                        <a:buSzTx/>
+                        <a:buFontTx/>
+                        <a:buNone/>
+                        <a:tabLst/>
+                        <a:defRPr/>
+                      </a:pPr>
+                      <a:r>
+                        <a:rPr lang="en-CA" sz="4400" dirty="0" smtClean="0"/>
+                        <a:t>Experiment shows 30 to 50 times faster than copy-reformat-copy-back</a:t>
+                      </a:r>
+                    </a:p>
+                  </a:txBody>
+                  <a:tcPr>
+                    <a:lnL w="12700" cap="flat" cmpd="sng" algn="ctr">
+                      <a:solidFill>
+                        <a:schemeClr val="tx1"/>
+                      </a:solidFill>
+                      <a:prstDash val="solid"/>
+                      <a:round/>
+                      <a:headEnd type="none" w="med" len="med"/>
+                      <a:tailEnd type="none" w="med" len="med"/>
+                    </a:lnL>
+                    <a:lnR w="12700" cap="flat" cmpd="sng" algn="ctr">
+                      <a:solidFill>
+                        <a:schemeClr val="tx1"/>
+                      </a:solidFill>
+                      <a:prstDash val="solid"/>
+                      <a:round/>
+                      <a:headEnd type="none" w="med" len="med"/>
+                      <a:tailEnd type="none" w="med" len="med"/>
+                    </a:lnR>
+                  </a:tcPr>
+                </a:tc>
+                <a:tc>
+                  <a:txBody>
+                    <a:bodyPr/>
+                    <a:lstStyle/>
+                    <a:p>
+                      <a:pPr algn="ctr"/>
+                      <a:r>
+                        <a:rPr lang="en-CA" sz="4400" dirty="0" smtClean="0">
+                          <a:solidFill>
+                            <a:schemeClr val="tx1"/>
+                          </a:solidFill>
+                        </a:rPr>
+                        <a:t>504</a:t>
+                      </a:r>
+                      <a:endParaRPr lang="en-CA" sz="4400" dirty="0">
                         <a:solidFill>
                           <a:schemeClr val="tx1"/>
                         </a:solidFill>
                       </a:endParaRPr>
                     </a:p>
                   </a:txBody>
-                  <a:tcPr/>
+                  <a:tcPr anchor="ctr">
+                    <a:lnL w="12700" cap="flat" cmpd="sng" algn="ctr">
+                      <a:solidFill>
+                        <a:schemeClr val="tx1"/>
+                      </a:solidFill>
+                      <a:prstDash val="solid"/>
+                      <a:round/>
+                      <a:headEnd type="none" w="med" len="med"/>
+                      <a:tailEnd type="none" w="med" len="med"/>
+                    </a:lnL>
+                  </a:tcPr>
                 </a:tc>
                 <a:tc>
                   <a:txBody>
                     <a:bodyPr/>
                     <a:lstStyle/>
                     <a:p>
+                      <a:pPr algn="ctr"/>
                       <a:r>
-                        <a:rPr lang="en-CA" sz="4800" dirty="0" smtClean="0">
+                        <a:rPr lang="en-CA" sz="4400" dirty="0" smtClean="0">
                           <a:solidFill>
                             <a:schemeClr val="tx1"/>
                           </a:solidFill>
                         </a:rPr>
-                        <a:t>504</a:t>
+                        <a:t>218 (</a:t>
                       </a:r>
-                      <a:endParaRPr lang="en-CA" sz="4800" dirty="0">
+                      <a:r>
+                        <a:rPr lang="en-CA" sz="4400" dirty="0" smtClean="0">
+                          <a:solidFill>
+                            <a:schemeClr val="tx1"/>
+                          </a:solidFill>
+                        </a:rPr>
+                        <a:t>Ext4)</a:t>
+                      </a:r>
+                    </a:p>
+                    <a:p>
+                      <a:pPr algn="ctr"/>
+                      <a:r>
+                        <a:rPr lang="en-CA" sz="4400" baseline="0" dirty="0" smtClean="0">
+                          <a:solidFill>
+                            <a:schemeClr val="tx1"/>
+                          </a:solidFill>
+                        </a:rPr>
+                        <a:t>to</a:t>
+                      </a:r>
+                    </a:p>
+                    <a:p>
+                      <a:pPr algn="ctr"/>
+                      <a:r>
+                        <a:rPr lang="en-CA" sz="4400" baseline="0" dirty="0" smtClean="0">
+                          <a:solidFill>
+                            <a:schemeClr val="tx1"/>
+                          </a:solidFill>
+                        </a:rPr>
+                        <a:t>1760 </a:t>
+                      </a:r>
+                      <a:r>
+                        <a:rPr lang="en-CA" sz="4400" baseline="0" dirty="0" smtClean="0">
+                          <a:solidFill>
+                            <a:schemeClr val="tx1"/>
+                          </a:solidFill>
+                        </a:rPr>
+                        <a:t>(F2FS)</a:t>
+                      </a:r>
+                      <a:endParaRPr lang="en-CA" sz="4400" dirty="0">
                         <a:solidFill>
                           <a:schemeClr val="tx1"/>
                         </a:solidFill>
                       </a:endParaRPr>
                     </a:p>
                   </a:txBody>
-                  <a:tcPr/>
-                </a:tc>
-                <a:tc>
-                  <a:txBody>
-                    <a:bodyPr/>
-                    <a:lstStyle/>
-                    <a:p>
-                      <a:r>
-                        <a:rPr lang="en-CA" sz="4800" dirty="0" smtClean="0">
-                          <a:solidFill>
-                            <a:schemeClr val="tx1"/>
-                          </a:solidFill>
-                        </a:rPr>
-                        <a:t>218 (Ext4)</a:t>
-                      </a:r>
-                      <a:r>
-                        <a:rPr lang="en-CA" sz="4800" baseline="0" dirty="0" smtClean="0">
-                          <a:solidFill>
-                            <a:schemeClr val="tx1"/>
-                          </a:solidFill>
-                        </a:rPr>
-                        <a:t>, 1760 (F2FS)</a:t>
-                      </a:r>
-                      <a:endParaRPr lang="en-CA" sz="4800" dirty="0">
-                        <a:solidFill>
-                          <a:schemeClr val="tx1"/>
-                        </a:solidFill>
-                      </a:endParaRPr>
-                    </a:p>
-                  </a:txBody>
-                  <a:tcPr/>
+                  <a:tcPr anchor="ctr"/>
                 </a:tc>
                 <a:extLst>
                   <a:ext uri="{0D108BD9-81ED-4DB2-BD59-A6C34878D82A}">
-                    <a16:rowId xmlns:a16="http://schemas.microsoft.com/office/drawing/2014/main" xmlns="" val="10004"/>
+                    <a16:rowId xmlns="" xmlns:a16="http://schemas.microsoft.com/office/drawing/2014/main" val="10004"/>
                   </a:ext>
                 </a:extLst>
               </a:tr>
@@ -14334,75 +15735,231 @@
                     <a:lstStyle/>
                     <a:p>
                       <a:r>
-                        <a:rPr lang="en-CA" sz="4800" dirty="0" smtClean="0">
+                        <a:rPr lang="en-CA" sz="4400" dirty="0" smtClean="0">
                           <a:solidFill>
                             <a:schemeClr val="tx1"/>
                           </a:solidFill>
                         </a:rPr>
-                        <a:t>Runtime</a:t>
+                        <a:t>File-System Aware Block</a:t>
                       </a:r>
                       <a:r>
-                        <a:rPr lang="en-CA" sz="4800" baseline="0" dirty="0" smtClean="0">
+                        <a:rPr lang="en-CA" sz="4400" baseline="0" dirty="0" smtClean="0">
                           <a:solidFill>
                             <a:schemeClr val="tx1"/>
                           </a:solidFill>
                         </a:rPr>
-                        <a:t> Interpretation</a:t>
+                        <a:t> Layer Cache</a:t>
                       </a:r>
-                      <a:endParaRPr lang="en-CA" sz="4800" dirty="0">
+                      <a:endParaRPr lang="en-CA" sz="4400" dirty="0">
                         <a:solidFill>
                           <a:schemeClr val="tx1"/>
                         </a:solidFill>
                       </a:endParaRPr>
                     </a:p>
                   </a:txBody>
-                  <a:tcPr/>
+                  <a:tcPr>
+                    <a:lnR w="12700" cap="flat" cmpd="sng" algn="ctr">
+                      <a:solidFill>
+                        <a:schemeClr val="tx1"/>
+                      </a:solidFill>
+                      <a:prstDash val="solid"/>
+                      <a:round/>
+                      <a:headEnd type="none" w="med" len="med"/>
+                      <a:tailEnd type="none" w="med" len="med"/>
+                    </a:lnR>
+                  </a:tcPr>
                 </a:tc>
                 <a:tc>
                   <a:txBody>
                     <a:bodyPr/>
                     <a:lstStyle/>
                     <a:p>
+                      <a:pPr marL="0" marR="0" lvl="0" indent="0" algn="l" defTabSz="1645920" rtl="0" eaLnBrk="1" fontAlgn="auto" latinLnBrk="0" hangingPunct="1">
+                        <a:lnSpc>
+                          <a:spcPct val="100000"/>
+                        </a:lnSpc>
+                        <a:spcBef>
+                          <a:spcPts val="0"/>
+                        </a:spcBef>
+                        <a:spcAft>
+                          <a:spcPts val="0"/>
+                        </a:spcAft>
+                        <a:buClrTx/>
+                        <a:buSzTx/>
+                        <a:buFontTx/>
+                        <a:buNone/>
+                        <a:tabLst/>
+                        <a:defRPr/>
+                      </a:pPr>
                       <a:r>
-                        <a:rPr lang="en-CA" sz="4800" dirty="0" smtClean="0">
+                        <a:rPr lang="en-CA" sz="4400" dirty="0" smtClean="0"/>
+                        <a:t>Intercepts and interprets blocks at the block layer during runtime, while the file system is mounted</a:t>
+                      </a:r>
+                    </a:p>
+                  </a:txBody>
+                  <a:tcPr>
+                    <a:lnL w="12700" cap="flat" cmpd="sng" algn="ctr">
+                      <a:solidFill>
+                        <a:schemeClr val="tx1"/>
+                      </a:solidFill>
+                      <a:prstDash val="solid"/>
+                      <a:round/>
+                      <a:headEnd type="none" w="med" len="med"/>
+                      <a:tailEnd type="none" w="med" len="med"/>
+                    </a:lnL>
+                    <a:lnR w="12700" cap="flat" cmpd="sng" algn="ctr">
+                      <a:solidFill>
+                        <a:schemeClr val="tx1"/>
+                      </a:solidFill>
+                      <a:prstDash val="solid"/>
+                      <a:round/>
+                      <a:headEnd type="none" w="med" len="med"/>
+                      <a:tailEnd type="none" w="med" len="med"/>
+                    </a:lnR>
+                  </a:tcPr>
+                </a:tc>
+                <a:tc>
+                  <a:txBody>
+                    <a:bodyPr/>
+                    <a:lstStyle/>
+                    <a:p>
+                      <a:pPr marL="0" marR="0" lvl="0" indent="0" algn="l" defTabSz="1645920" rtl="0" eaLnBrk="1" fontAlgn="auto" latinLnBrk="0" hangingPunct="1">
+                        <a:lnSpc>
+                          <a:spcPct val="100000"/>
+                        </a:lnSpc>
+                        <a:spcBef>
+                          <a:spcPts val="0"/>
+                        </a:spcBef>
+                        <a:spcAft>
+                          <a:spcPts val="0"/>
+                        </a:spcAft>
+                        <a:buClrTx/>
+                        <a:buSzTx/>
+                        <a:buFontTx/>
+                        <a:buNone/>
+                        <a:tabLst/>
+                        <a:defRPr/>
+                      </a:pPr>
+                      <a:r>
+                        <a:rPr lang="en-CA" sz="4400" dirty="0" smtClean="0">
                           <a:solidFill>
                             <a:schemeClr val="tx1"/>
                           </a:solidFill>
                         </a:rPr>
-                        <a:t>2158</a:t>
+                        <a:t>Allow for rich set of caching</a:t>
                       </a:r>
-                      <a:endParaRPr lang="en-CA" sz="4800" dirty="0">
+                      <a:r>
+                        <a:rPr lang="en-CA" sz="4400" baseline="0" dirty="0" smtClean="0">
+                          <a:solidFill>
+                            <a:schemeClr val="tx1"/>
+                          </a:solidFill>
+                        </a:rPr>
+                        <a:t> policies without modification to file system</a:t>
+                      </a:r>
+                      <a:endParaRPr lang="en-CA" sz="4400" dirty="0">
                         <a:solidFill>
                           <a:schemeClr val="tx1"/>
                         </a:solidFill>
                       </a:endParaRPr>
                     </a:p>
                   </a:txBody>
-                  <a:tcPr/>
+                  <a:tcPr>
+                    <a:lnL w="12700" cap="flat" cmpd="sng" algn="ctr">
+                      <a:solidFill>
+                        <a:schemeClr val="tx1"/>
+                      </a:solidFill>
+                      <a:prstDash val="solid"/>
+                      <a:round/>
+                      <a:headEnd type="none" w="med" len="med"/>
+                      <a:tailEnd type="none" w="med" len="med"/>
+                    </a:lnL>
+                    <a:lnR w="12700" cap="flat" cmpd="sng" algn="ctr">
+                      <a:solidFill>
+                        <a:schemeClr val="tx1"/>
+                      </a:solidFill>
+                      <a:prstDash val="solid"/>
+                      <a:round/>
+                      <a:headEnd type="none" w="med" len="med"/>
+                      <a:tailEnd type="none" w="med" len="med"/>
+                    </a:lnR>
+                  </a:tcPr>
                 </a:tc>
                 <a:tc>
                   <a:txBody>
                     <a:bodyPr/>
                     <a:lstStyle/>
                     <a:p>
+                      <a:pPr algn="ctr"/>
                       <a:r>
-                        <a:rPr lang="en-CA" sz="4800" dirty="0" smtClean="0">
+                        <a:rPr lang="en-CA" sz="4400" dirty="0" smtClean="0">
                           <a:solidFill>
                             <a:schemeClr val="tx1"/>
                           </a:solidFill>
                         </a:rPr>
-                        <a:t>111 (Ext4),</a:t>
+                        <a:t>2447</a:t>
                       </a:r>
+                      <a:endParaRPr lang="en-CA" sz="4400" dirty="0">
+                        <a:solidFill>
+                          <a:schemeClr val="tx1"/>
+                        </a:solidFill>
+                      </a:endParaRPr>
+                    </a:p>
+                  </a:txBody>
+                  <a:tcPr anchor="ctr">
+                    <a:lnL w="12700" cap="flat" cmpd="sng" algn="ctr">
+                      <a:solidFill>
+                        <a:schemeClr val="tx1"/>
+                      </a:solidFill>
+                      <a:prstDash val="solid"/>
+                      <a:round/>
+                      <a:headEnd type="none" w="med" len="med"/>
+                      <a:tailEnd type="none" w="med" len="med"/>
+                    </a:lnL>
+                  </a:tcPr>
+                </a:tc>
+                <a:tc>
+                  <a:txBody>
+                    <a:bodyPr/>
+                    <a:lstStyle/>
+                    <a:p>
+                      <a:pPr algn="ctr"/>
                       <a:r>
-                        <a:rPr lang="en-CA" sz="4800" baseline="0" dirty="0" smtClean="0">
+                        <a:rPr lang="en-CA" sz="4400" dirty="0" smtClean="0">
                           <a:solidFill>
                             <a:schemeClr val="tx1"/>
                           </a:solidFill>
                         </a:rPr>
-                        <a:t> 134 (</a:t>
+                        <a:t>111 (</a:t>
                       </a:r>
                       <a:r>
-                        <a:rPr lang="en-CA" sz="4800" baseline="0" dirty="0" err="1" smtClean="0">
+                        <a:rPr lang="en-CA" sz="4400" dirty="0" smtClean="0">
+                          <a:solidFill>
+                            <a:schemeClr val="tx1"/>
+                          </a:solidFill>
+                        </a:rPr>
+                        <a:t>Ext4)</a:t>
+                      </a:r>
+                    </a:p>
+                    <a:p>
+                      <a:pPr algn="ctr"/>
+                      <a:r>
+                        <a:rPr lang="en-CA" sz="4400" baseline="0" dirty="0" smtClean="0">
+                          <a:solidFill>
+                            <a:schemeClr val="tx1"/>
+                          </a:solidFill>
+                        </a:rPr>
+                        <a:t>134 </a:t>
+                      </a:r>
+                      <a:r>
+                        <a:rPr lang="en-CA" sz="4400" baseline="0" dirty="0" smtClean="0">
+                          <a:solidFill>
+                            <a:schemeClr val="tx1"/>
+                          </a:solidFill>
+                        </a:rPr>
+                        <a:t>(</a:t>
+                      </a:r>
+                      <a:r>
+                        <a:rPr lang="en-CA" sz="4400" baseline="0" dirty="0" err="1" smtClean="0">
                           <a:solidFill>
                             <a:schemeClr val="tx1"/>
                           </a:solidFill>
@@ -14410,25 +15967,25 @@
                         <a:t>Btrfs</a:t>
                       </a:r>
                       <a:r>
-                        <a:rPr lang="en-CA" sz="4800" baseline="0" dirty="0" smtClean="0">
+                        <a:rPr lang="en-CA" sz="4400" baseline="0" dirty="0" smtClean="0">
                           <a:solidFill>
                             <a:schemeClr val="tx1"/>
                           </a:solidFill>
                         </a:rPr>
                         <a:t>)</a:t>
                       </a:r>
-                      <a:endParaRPr lang="en-CA" sz="4800" dirty="0">
+                      <a:endParaRPr lang="en-CA" sz="4400" dirty="0">
                         <a:solidFill>
                           <a:schemeClr val="tx1"/>
                         </a:solidFill>
                       </a:endParaRPr>
                     </a:p>
                   </a:txBody>
-                  <a:tcPr/>
+                  <a:tcPr anchor="ctr"/>
                 </a:tc>
                 <a:extLst>
                   <a:ext uri="{0D108BD9-81ED-4DB2-BD59-A6C34878D82A}">
-                    <a16:rowId xmlns:a16="http://schemas.microsoft.com/office/drawing/2014/main" xmlns="" val="10005"/>
+                    <a16:rowId xmlns="" xmlns:a16="http://schemas.microsoft.com/office/drawing/2014/main" val="10005"/>
                   </a:ext>
                 </a:extLst>
               </a:tr>
@@ -14438,52 +15995,14 @@
       </p:graphicFrame>
       <p:sp>
         <p:nvSpPr>
-          <p:cNvPr id="10" name="TextBox 9"/>
-          <p:cNvSpPr txBox="1"/>
-          <p:nvPr/>
-        </p:nvSpPr>
-        <p:spPr>
-          <a:xfrm>
-            <a:off x="1232835" y="34111306"/>
-            <a:ext cx="14922676" cy="1446550"/>
-          </a:xfrm>
-          <a:prstGeom prst="rect">
-            <a:avLst/>
-          </a:prstGeom>
-          <a:noFill/>
-        </p:spPr>
-        <p:txBody>
-          <a:bodyPr wrap="none" rtlCol="0">
-            <a:spAutoFit/>
-          </a:bodyPr>
-          <a:lstStyle/>
-          <a:p>
-            <a:pPr algn="ctr"/>
-            <a:r>
-              <a:rPr lang="en-CA" sz="4400" dirty="0" smtClean="0"/>
-              <a:t>Line of code count for each application: </a:t>
-            </a:r>
-            <a:br>
-              <a:rPr lang="en-CA" sz="4400" dirty="0" smtClean="0"/>
-            </a:br>
-            <a:r>
-              <a:rPr lang="en-CA" sz="4400" dirty="0" smtClean="0"/>
-              <a:t>generic application code vs. file-system specific code</a:t>
-            </a:r>
-            <a:endParaRPr lang="en-CA" sz="4400" dirty="0"/>
-          </a:p>
-        </p:txBody>
-      </p:sp>
-      <p:sp>
-        <p:nvSpPr>
           <p:cNvPr id="11" name="Rectangle 10"/>
           <p:cNvSpPr/>
           <p:nvPr/>
         </p:nvSpPr>
         <p:spPr>
           <a:xfrm>
-            <a:off x="685800" y="26494334"/>
-            <a:ext cx="15278100" cy="2410916"/>
+            <a:off x="685800" y="26380034"/>
+            <a:ext cx="15278100" cy="830997"/>
           </a:xfrm>
           <a:prstGeom prst="rect">
             <a:avLst/>
@@ -14507,9 +16026,36 @@
             </a:pPr>
             <a:r>
               <a:rPr lang="en-CA" sz="4800" dirty="0" smtClean="0"/>
-              <a:t>Requires little file-system specific code</a:t>
+              <a:t>Requires little file-system specific </a:t>
             </a:r>
+            <a:r>
+              <a:rPr lang="en-CA" sz="4800" dirty="0" smtClean="0"/>
+              <a:t>code</a:t>
+            </a:r>
+            <a:endParaRPr lang="en-CA" sz="4800" dirty="0" smtClean="0"/>
           </a:p>
+        </p:txBody>
+      </p:sp>
+      <p:sp>
+        <p:nvSpPr>
+          <p:cNvPr id="3" name="Rectangle 2"/>
+          <p:cNvSpPr/>
+          <p:nvPr/>
+        </p:nvSpPr>
+        <p:spPr>
+          <a:xfrm>
+            <a:off x="14896789" y="26348870"/>
+            <a:ext cx="16459200" cy="830997"/>
+          </a:xfrm>
+          <a:prstGeom prst="rect">
+            <a:avLst/>
+          </a:prstGeom>
+        </p:spPr>
+        <p:txBody>
+          <a:bodyPr>
+            <a:spAutoFit/>
+          </a:bodyPr>
+          <a:lstStyle/>
           <a:p>
             <a:pPr marL="1181100" indent="-647700">
               <a:spcBef>
@@ -14522,68 +16068,326 @@
               </a:tabLst>
             </a:pPr>
             <a:r>
-              <a:rPr lang="en-CA" sz="4800" dirty="0" smtClean="0"/>
+              <a:rPr lang="en-CA" sz="4800" dirty="0"/>
               <a:t>Works for multiple file systems (Ext4, </a:t>
             </a:r>
             <a:r>
-              <a:rPr lang="en-CA" sz="4800" dirty="0" err="1" smtClean="0"/>
+              <a:rPr lang="en-CA" sz="4800" dirty="0" err="1"/>
               <a:t>Btrfs</a:t>
             </a:r>
             <a:r>
-              <a:rPr lang="en-CA" sz="4800" dirty="0" smtClean="0"/>
+              <a:rPr lang="en-CA" sz="4800" dirty="0"/>
               <a:t>, F2FS)</a:t>
             </a:r>
           </a:p>
-          <a:p>
-            <a:pPr marL="1181100" indent="-647700">
-              <a:spcBef>
-                <a:spcPts val="400"/>
-              </a:spcBef>
-              <a:buFont typeface="Arial" panose="020B0604020202020204" pitchFamily="34" charset="0"/>
-              <a:buChar char="•"/>
-              <a:tabLst>
-                <a:tab pos="1257300" algn="l"/>
-              </a:tabLst>
-            </a:pPr>
-            <a:r>
-              <a:rPr lang="en-CA" sz="4800" dirty="0" smtClean="0"/>
-              <a:t>Robust against file system corruptions</a:t>
-            </a:r>
-            <a:endParaRPr lang="en-CA" sz="4800" dirty="0"/>
-          </a:p>
         </p:txBody>
       </p:sp>
+      <p:cxnSp>
+        <p:nvCxnSpPr>
+          <p:cNvPr id="7" name="Straight Connector 6"/>
+          <p:cNvCxnSpPr/>
+          <p:nvPr/>
+        </p:nvCxnSpPr>
+        <p:spPr>
+          <a:xfrm flipH="1" flipV="1">
+            <a:off x="1143944" y="25202774"/>
+            <a:ext cx="31130412" cy="76200"/>
+          </a:xfrm>
+          <a:prstGeom prst="line">
+            <a:avLst/>
+          </a:prstGeom>
+          <a:ln>
+            <a:solidFill>
+              <a:schemeClr val="tx1"/>
+            </a:solidFill>
+          </a:ln>
+        </p:spPr>
+        <p:style>
+          <a:lnRef idx="1">
+            <a:schemeClr val="accent1"/>
+          </a:lnRef>
+          <a:fillRef idx="0">
+            <a:schemeClr val="accent1"/>
+          </a:fillRef>
+          <a:effectRef idx="0">
+            <a:schemeClr val="accent1"/>
+          </a:effectRef>
+          <a:fontRef idx="minor">
+            <a:schemeClr val="tx1"/>
+          </a:fontRef>
+        </p:style>
+      </p:cxnSp>
+      <p:graphicFrame>
+        <p:nvGraphicFramePr>
+          <p:cNvPr id="67" name="Chart 66"/>
+          <p:cNvGraphicFramePr>
+            <a:graphicFrameLocks/>
+          </p:cNvGraphicFramePr>
+          <p:nvPr>
+            <p:extLst>
+              <p:ext uri="{D42A27DB-BD31-4B8C-83A1-F6EECF244321}">
+                <p14:modId xmlns:p14="http://schemas.microsoft.com/office/powerpoint/2010/main" val="1583113483"/>
+              </p:ext>
+            </p:extLst>
+          </p:nvPr>
+        </p:nvGraphicFramePr>
+        <p:xfrm>
+          <a:off x="-635572" y="38192547"/>
+          <a:ext cx="23850689" cy="4602166"/>
+        </p:xfrm>
+        <a:graphic>
+          <a:graphicData uri="http://schemas.openxmlformats.org/drawingml/2006/chart">
+            <c:chart xmlns:c="http://schemas.openxmlformats.org/drawingml/2006/chart" xmlns:r="http://schemas.openxmlformats.org/officeDocument/2006/relationships" r:id="rId4"/>
+          </a:graphicData>
+        </a:graphic>
+      </p:graphicFrame>
+      <p:grpSp>
+        <p:nvGrpSpPr>
+          <p:cNvPr id="18" name="Group 17"/>
+          <p:cNvGrpSpPr/>
+          <p:nvPr/>
+        </p:nvGrpSpPr>
+        <p:grpSpPr>
+          <a:xfrm>
+            <a:off x="23215117" y="38142286"/>
+            <a:ext cx="9032427" cy="769441"/>
+            <a:chOff x="23215117" y="39132886"/>
+            <a:chExt cx="9032427" cy="769441"/>
+          </a:xfrm>
+        </p:grpSpPr>
+        <p:sp>
+          <p:nvSpPr>
+            <p:cNvPr id="10" name="TextBox 9"/>
+            <p:cNvSpPr txBox="1"/>
+            <p:nvPr/>
+          </p:nvSpPr>
+          <p:spPr>
+            <a:xfrm>
+              <a:off x="24000662" y="39132886"/>
+              <a:ext cx="7461338" cy="769441"/>
+            </a:xfrm>
+            <a:prstGeom prst="rect">
+              <a:avLst/>
+            </a:prstGeom>
+            <a:noFill/>
+          </p:spPr>
+          <p:txBody>
+            <a:bodyPr wrap="square" rtlCol="0">
+              <a:spAutoFit/>
+            </a:bodyPr>
+            <a:lstStyle/>
+            <a:p>
+              <a:pPr algn="ctr"/>
+              <a:r>
+                <a:rPr lang="en-CA" sz="4400" dirty="0" smtClean="0"/>
+                <a:t>Line of </a:t>
+              </a:r>
+              <a:r>
+                <a:rPr lang="en-CA" sz="4400" dirty="0" smtClean="0"/>
+                <a:t>code count</a:t>
+              </a:r>
+              <a:endParaRPr lang="en-CA" sz="4400" dirty="0"/>
+            </a:p>
+          </p:txBody>
+        </p:sp>
+        <p:cxnSp>
+          <p:nvCxnSpPr>
+            <p:cNvPr id="13" name="Straight Connector 12"/>
+            <p:cNvCxnSpPr/>
+            <p:nvPr/>
+          </p:nvCxnSpPr>
+          <p:spPr>
+            <a:xfrm rot="16200000" flipH="1">
+              <a:off x="23836117" y="38562147"/>
+              <a:ext cx="378000" cy="1620000"/>
+            </a:xfrm>
+            <a:prstGeom prst="bentConnector2">
+              <a:avLst/>
+            </a:prstGeom>
+            <a:ln w="38100">
+              <a:solidFill>
+                <a:schemeClr val="tx1"/>
+              </a:solidFill>
+            </a:ln>
+          </p:spPr>
+          <p:style>
+            <a:lnRef idx="1">
+              <a:schemeClr val="accent1"/>
+            </a:lnRef>
+            <a:fillRef idx="0">
+              <a:schemeClr val="accent1"/>
+            </a:fillRef>
+            <a:effectRef idx="0">
+              <a:schemeClr val="accent1"/>
+            </a:effectRef>
+            <a:fontRef idx="minor">
+              <a:schemeClr val="tx1"/>
+            </a:fontRef>
+          </p:style>
+        </p:cxnSp>
+        <p:cxnSp>
+          <p:nvCxnSpPr>
+            <p:cNvPr id="75" name="Straight Connector 12"/>
+            <p:cNvCxnSpPr/>
+            <p:nvPr/>
+          </p:nvCxnSpPr>
+          <p:spPr>
+            <a:xfrm rot="10800000" flipH="1">
+              <a:off x="30627544" y="39183147"/>
+              <a:ext cx="1620000" cy="378000"/>
+            </a:xfrm>
+            <a:prstGeom prst="bentConnector2">
+              <a:avLst/>
+            </a:prstGeom>
+            <a:ln w="38100">
+              <a:solidFill>
+                <a:schemeClr val="tx1"/>
+              </a:solidFill>
+            </a:ln>
+          </p:spPr>
+          <p:style>
+            <a:lnRef idx="1">
+              <a:schemeClr val="accent1"/>
+            </a:lnRef>
+            <a:fillRef idx="0">
+              <a:schemeClr val="accent1"/>
+            </a:fillRef>
+            <a:effectRef idx="0">
+              <a:schemeClr val="accent1"/>
+            </a:effectRef>
+            <a:fontRef idx="minor">
+              <a:schemeClr val="tx1"/>
+            </a:fontRef>
+          </p:style>
+        </p:cxnSp>
+      </p:grpSp>
       <p:sp>
         <p:nvSpPr>
-          <p:cNvPr id="132" name="TextBox 131"/>
-          <p:cNvSpPr txBox="1"/>
+          <p:cNvPr id="19" name="Rectangle 18"/>
+          <p:cNvSpPr/>
           <p:nvPr/>
         </p:nvSpPr>
         <p:spPr>
           <a:xfrm>
-            <a:off x="474815" y="42675068"/>
-            <a:ext cx="18976670" cy="769441"/>
+            <a:off x="280217" y="38107903"/>
+            <a:ext cx="1378904" cy="830997"/>
           </a:xfrm>
           <a:prstGeom prst="rect">
             <a:avLst/>
           </a:prstGeom>
-          <a:noFill/>
         </p:spPr>
         <p:txBody>
-          <a:bodyPr wrap="none" rtlCol="0">
+          <a:bodyPr wrap="none">
             <a:spAutoFit/>
           </a:bodyPr>
           <a:lstStyle/>
           <a:p>
-            <a:pPr algn="ctr"/>
             <a:r>
-              <a:rPr lang="en-CA" sz="4400" dirty="0" smtClean="0"/>
-              <a:t>2 Identical fileservers running on Spiffy file-system aware block cache</a:t>
+              <a:rPr lang="en-CA" sz="4800" b="1" dirty="0"/>
+              <a:t>Ext4</a:t>
             </a:r>
-            <a:endParaRPr lang="en-CA" sz="4400" dirty="0"/>
           </a:p>
         </p:txBody>
       </p:sp>
+      <p:graphicFrame>
+        <p:nvGraphicFramePr>
+          <p:cNvPr id="109" name="Chart 108"/>
+          <p:cNvGraphicFramePr>
+            <a:graphicFrameLocks/>
+          </p:cNvGraphicFramePr>
+          <p:nvPr>
+            <p:extLst>
+              <p:ext uri="{D42A27DB-BD31-4B8C-83A1-F6EECF244321}">
+                <p14:modId xmlns:p14="http://schemas.microsoft.com/office/powerpoint/2010/main" val="4020796045"/>
+              </p:ext>
+            </p:extLst>
+          </p:nvPr>
+        </p:nvGraphicFramePr>
+        <p:xfrm>
+          <a:off x="19129243" y="38841885"/>
+          <a:ext cx="13118302" cy="4867274"/>
+        </p:xfrm>
+        <a:graphic>
+          <a:graphicData uri="http://schemas.openxmlformats.org/drawingml/2006/chart">
+            <c:chart xmlns:c="http://schemas.openxmlformats.org/drawingml/2006/chart" xmlns:r="http://schemas.openxmlformats.org/officeDocument/2006/relationships" r:id="rId5"/>
+          </a:graphicData>
+        </a:graphic>
+      </p:graphicFrame>
+      <p:grpSp>
+        <p:nvGrpSpPr>
+          <p:cNvPr id="25" name="Group 24"/>
+          <p:cNvGrpSpPr/>
+          <p:nvPr/>
+        </p:nvGrpSpPr>
+        <p:grpSpPr>
+          <a:xfrm>
+            <a:off x="280217" y="42832813"/>
+            <a:ext cx="18845983" cy="870027"/>
+            <a:chOff x="280217" y="42794713"/>
+            <a:chExt cx="18845983" cy="870027"/>
+          </a:xfrm>
+        </p:grpSpPr>
+        <p:sp>
+          <p:nvSpPr>
+            <p:cNvPr id="68" name="TextBox 67"/>
+            <p:cNvSpPr txBox="1"/>
+            <p:nvPr/>
+          </p:nvSpPr>
+          <p:spPr>
+            <a:xfrm>
+              <a:off x="280217" y="42895299"/>
+              <a:ext cx="18845983" cy="769441"/>
+            </a:xfrm>
+            <a:prstGeom prst="rect">
+              <a:avLst/>
+            </a:prstGeom>
+            <a:noFill/>
+          </p:spPr>
+          <p:txBody>
+            <a:bodyPr wrap="square" rtlCol="0">
+              <a:spAutoFit/>
+            </a:bodyPr>
+            <a:lstStyle/>
+            <a:p>
+              <a:r>
+                <a:rPr lang="en-CA" sz="4400" dirty="0" smtClean="0"/>
+                <a:t>2 Identical fileservers running on Spiffy file-system aware block cache</a:t>
+              </a:r>
+              <a:endParaRPr lang="en-CA" sz="4400" dirty="0"/>
+            </a:p>
+          </p:txBody>
+        </p:sp>
+        <p:cxnSp>
+          <p:nvCxnSpPr>
+            <p:cNvPr id="24" name="Straight Connector 23"/>
+            <p:cNvCxnSpPr/>
+            <p:nvPr/>
+          </p:nvCxnSpPr>
+          <p:spPr>
+            <a:xfrm>
+              <a:off x="280217" y="42794713"/>
+              <a:ext cx="18845983" cy="0"/>
+            </a:xfrm>
+            <a:prstGeom prst="line">
+              <a:avLst/>
+            </a:prstGeom>
+          </p:spPr>
+          <p:style>
+            <a:lnRef idx="1">
+              <a:schemeClr val="accent1"/>
+            </a:lnRef>
+            <a:fillRef idx="0">
+              <a:schemeClr val="accent1"/>
+            </a:fillRef>
+            <a:effectRef idx="0">
+              <a:schemeClr val="accent1"/>
+            </a:effectRef>
+            <a:fontRef idx="minor">
+              <a:schemeClr val="tx1"/>
+            </a:fontRef>
+          </p:style>
+        </p:cxnSp>
+      </p:grpSp>
     </p:spTree>
   </p:cSld>
   <p:clrMapOvr>

</xml_diff>